<commit_message>
Bug Fix in data_curating
</commit_message>
<xml_diff>
--- a/Reports:Notes/Midterm Presentation.pptx
+++ b/Reports:Notes/Midterm Presentation.pptx
@@ -15,6 +15,7 @@
     <p:sldId id="263" r:id="rId9"/>
     <p:sldId id="264" r:id="rId10"/>
     <p:sldId id="266" r:id="rId11"/>
+    <p:sldId id="268" r:id="rId12"/>
   </p:sldIdLst>
   <p:sldSz cx="12192000" cy="6858000"/>
   <p:notesSz cx="6858000" cy="9144000"/>
@@ -3999,7 +4000,7 @@
         <p:spPr/>
         <p:txBody>
           <a:bodyPr>
-            <a:normAutofit lnSpcReduction="10000"/>
+            <a:normAutofit/>
           </a:bodyPr>
           <a:lstStyle/>
           <a:p>
@@ -4042,16 +4043,6 @@
                 <a:ea typeface="CMU Serif Roman" panose="02000603000000000000" pitchFamily="2" charset="0"/>
                 <a:cs typeface="CMU Serif Roman" panose="02000603000000000000" pitchFamily="2" charset="0"/>
               </a:rPr>
-              <a:t>This problem, at the root, is a weather prediction problem. Something with that? </a:t>
-            </a:r>
-          </a:p>
-          <a:p>
-            <a:r>
-              <a:rPr lang="en-US" dirty="0">
-                <a:latin typeface="CMU Serif Roman" panose="02000603000000000000" pitchFamily="2" charset="0"/>
-                <a:ea typeface="CMU Serif Roman" panose="02000603000000000000" pitchFamily="2" charset="0"/>
-                <a:cs typeface="CMU Serif Roman" panose="02000603000000000000" pitchFamily="2" charset="0"/>
-              </a:rPr>
               <a:t>PCA (if time) </a:t>
             </a:r>
           </a:p>
@@ -4094,6 +4085,134 @@
     <p:extLst>
       <p:ext uri="{BB962C8B-B14F-4D97-AF65-F5344CB8AC3E}">
         <p14:creationId xmlns:p14="http://schemas.microsoft.com/office/powerpoint/2010/main" val="3100146989"/>
+      </p:ext>
+    </p:extLst>
+  </p:cSld>
+  <p:clrMapOvr>
+    <a:masterClrMapping/>
+  </p:clrMapOvr>
+</p:sld>
+</file>
+
+<file path=ppt/slides/slide11.xml><?xml version="1.0" encoding="utf-8"?>
+<p:sld xmlns:a="http://schemas.openxmlformats.org/drawingml/2006/main" xmlns:r="http://schemas.openxmlformats.org/officeDocument/2006/relationships" xmlns:p="http://schemas.openxmlformats.org/presentationml/2006/main">
+  <p:cSld>
+    <p:spTree>
+      <p:nvGrpSpPr>
+        <p:cNvPr id="1" name=""/>
+        <p:cNvGrpSpPr/>
+        <p:nvPr/>
+      </p:nvGrpSpPr>
+      <p:grpSpPr>
+        <a:xfrm>
+          <a:off x="0" y="0"/>
+          <a:ext cx="0" cy="0"/>
+          <a:chOff x="0" y="0"/>
+          <a:chExt cx="0" cy="0"/>
+        </a:xfrm>
+      </p:grpSpPr>
+      <p:sp>
+        <p:nvSpPr>
+          <p:cNvPr id="2" name="Title 1">
+            <a:extLst>
+              <a:ext uri="{FF2B5EF4-FFF2-40B4-BE49-F238E27FC236}">
+                <a16:creationId xmlns:a16="http://schemas.microsoft.com/office/drawing/2014/main" id="{F4364AB2-0A7A-8343-ACBA-20F900B6CE5E}"/>
+              </a:ext>
+            </a:extLst>
+          </p:cNvPr>
+          <p:cNvSpPr>
+            <a:spLocks noGrp="1"/>
+          </p:cNvSpPr>
+          <p:nvPr>
+            <p:ph type="title"/>
+          </p:nvPr>
+        </p:nvSpPr>
+        <p:spPr/>
+        <p:txBody>
+          <a:bodyPr/>
+          <a:lstStyle/>
+          <a:p>
+            <a:r>
+              <a:rPr lang="en-US" dirty="0">
+                <a:latin typeface="CMU Serif Roman" panose="02000603000000000000" pitchFamily="2" charset="0"/>
+                <a:ea typeface="CMU Serif Roman" panose="02000603000000000000" pitchFamily="2" charset="0"/>
+                <a:cs typeface="CMU Serif Roman" panose="02000603000000000000" pitchFamily="2" charset="0"/>
+              </a:rPr>
+              <a:t>Resources</a:t>
+            </a:r>
+          </a:p>
+        </p:txBody>
+      </p:sp>
+      <p:sp>
+        <p:nvSpPr>
+          <p:cNvPr id="3" name="Content Placeholder 2">
+            <a:extLst>
+              <a:ext uri="{FF2B5EF4-FFF2-40B4-BE49-F238E27FC236}">
+                <a16:creationId xmlns:a16="http://schemas.microsoft.com/office/drawing/2014/main" id="{7905A2CB-7280-AA48-888E-8F77EE1C7270}"/>
+              </a:ext>
+            </a:extLst>
+          </p:cNvPr>
+          <p:cNvSpPr>
+            <a:spLocks noGrp="1"/>
+          </p:cNvSpPr>
+          <p:nvPr>
+            <p:ph idx="1"/>
+          </p:nvPr>
+        </p:nvSpPr>
+        <p:spPr/>
+        <p:txBody>
+          <a:bodyPr/>
+          <a:lstStyle/>
+          <a:p>
+            <a:r>
+              <a:rPr lang="en-US" dirty="0">
+                <a:latin typeface="CMU Serif Roman" panose="02000603000000000000" pitchFamily="2" charset="0"/>
+                <a:ea typeface="CMU Serif Roman" panose="02000603000000000000" pitchFamily="2" charset="0"/>
+                <a:cs typeface="CMU Serif Roman" panose="02000603000000000000" pitchFamily="2" charset="0"/>
+              </a:rPr>
+              <a:t>“Solar Power Forecasting with Machine Learning Techniques”</a:t>
+            </a:r>
+          </a:p>
+          <a:p>
+            <a:r>
+              <a:rPr lang="en-US" dirty="0">
+                <a:latin typeface="CMU Serif Roman" panose="02000603000000000000" pitchFamily="2" charset="0"/>
+                <a:ea typeface="CMU Serif Roman" panose="02000603000000000000" pitchFamily="2" charset="0"/>
+                <a:cs typeface="CMU Serif Roman" panose="02000603000000000000" pitchFamily="2" charset="0"/>
+              </a:rPr>
+              <a:t>“Deep Learning for Big Data Time Series Forecasting Applied to Solar Power”</a:t>
+            </a:r>
+          </a:p>
+          <a:p>
+            <a:r>
+              <a:rPr lang="en-US" dirty="0">
+                <a:latin typeface="CMU Serif Roman" panose="02000603000000000000" pitchFamily="2" charset="0"/>
+                <a:ea typeface="CMU Serif Roman" panose="02000603000000000000" pitchFamily="2" charset="0"/>
+                <a:cs typeface="CMU Serif Roman" panose="02000603000000000000" pitchFamily="2" charset="0"/>
+              </a:rPr>
+              <a:t>“Forecasting of Solar Energy with Application for a Growing Economy Like India: Survey and Implication” </a:t>
+            </a:r>
+          </a:p>
+          <a:p>
+            <a:endParaRPr lang="en-US" dirty="0">
+              <a:latin typeface="CMU Serif Roman" panose="02000603000000000000" pitchFamily="2" charset="0"/>
+              <a:ea typeface="CMU Serif Roman" panose="02000603000000000000" pitchFamily="2" charset="0"/>
+              <a:cs typeface="CMU Serif Roman" panose="02000603000000000000" pitchFamily="2" charset="0"/>
+            </a:endParaRPr>
+          </a:p>
+          <a:p>
+            <a:endParaRPr lang="en-US" dirty="0">
+              <a:latin typeface="CMU Serif Roman" panose="02000603000000000000" pitchFamily="2" charset="0"/>
+              <a:ea typeface="CMU Serif Roman" panose="02000603000000000000" pitchFamily="2" charset="0"/>
+              <a:cs typeface="CMU Serif Roman" panose="02000603000000000000" pitchFamily="2" charset="0"/>
+            </a:endParaRPr>
+          </a:p>
+        </p:txBody>
+      </p:sp>
+    </p:spTree>
+    <p:extLst>
+      <p:ext uri="{BB962C8B-B14F-4D97-AF65-F5344CB8AC3E}">
+        <p14:creationId xmlns:p14="http://schemas.microsoft.com/office/powerpoint/2010/main" val="1316892596"/>
       </p:ext>
     </p:extLst>
   </p:cSld>
@@ -5980,12 +6099,12 @@
         </p:spPr>
         <p:txBody>
           <a:bodyPr anchor="ctr">
-            <a:normAutofit/>
+            <a:normAutofit lnSpcReduction="10000"/>
           </a:bodyPr>
           <a:lstStyle/>
           <a:p>
             <a:r>
-              <a:rPr lang="en-US" sz="1800">
+              <a:rPr lang="en-US" sz="1800" dirty="0">
                 <a:latin typeface="CMU Serif Roman" panose="02000603000000000000" pitchFamily="2" charset="0"/>
                 <a:ea typeface="CMU Serif Roman" panose="02000603000000000000" pitchFamily="2" charset="0"/>
                 <a:cs typeface="CMU Serif Roman" panose="02000603000000000000" pitchFamily="2" charset="0"/>
@@ -5995,7 +6114,17 @@
           </a:p>
           <a:p>
             <a:r>
-              <a:rPr lang="en-US" sz="1800">
+              <a:rPr lang="en-US" sz="1800" dirty="0">
+                <a:latin typeface="CMU Serif Roman" panose="02000603000000000000" pitchFamily="2" charset="0"/>
+                <a:ea typeface="CMU Serif Roman" panose="02000603000000000000" pitchFamily="2" charset="0"/>
+                <a:cs typeface="CMU Serif Roman" panose="02000603000000000000" pitchFamily="2" charset="0"/>
+              </a:rPr>
+              <a:t>Affected 44% of the hours</a:t>
+            </a:r>
+          </a:p>
+          <a:p>
+            <a:r>
+              <a:rPr lang="en-US" sz="1800" dirty="0">
                 <a:latin typeface="CMU Serif Roman" panose="02000603000000000000" pitchFamily="2" charset="0"/>
                 <a:ea typeface="CMU Serif Roman" panose="02000603000000000000" pitchFamily="2" charset="0"/>
                 <a:cs typeface="CMU Serif Roman" panose="02000603000000000000" pitchFamily="2" charset="0"/>
@@ -6005,7 +6134,7 @@
           </a:p>
           <a:p>
             <a:r>
-              <a:rPr lang="en-US" sz="1800">
+              <a:rPr lang="en-US" sz="1800" dirty="0">
                 <a:latin typeface="CMU Serif Roman" panose="02000603000000000000" pitchFamily="2" charset="0"/>
                 <a:ea typeface="CMU Serif Roman" panose="02000603000000000000" pitchFamily="2" charset="0"/>
                 <a:cs typeface="CMU Serif Roman" panose="02000603000000000000" pitchFamily="2" charset="0"/>
@@ -6036,7 +6165,7 @@
         </p:blipFill>
         <p:spPr>
           <a:xfrm>
-            <a:off x="6129280" y="730949"/>
+            <a:off x="6096000" y="783418"/>
             <a:ext cx="5669705" cy="5496116"/>
           </a:xfrm>
           <a:prstGeom prst="rect">

</xml_diff>

<commit_message>
split data into seasons and fit random forest
</commit_message>
<xml_diff>
--- a/Reports:Notes/Midterm Presentation.pptx
+++ b/Reports:Notes/Midterm Presentation.pptx
@@ -4,6 +4,9 @@
   <p:sldMasterIdLst>
     <p:sldMasterId id="2147483648" r:id="rId1"/>
   </p:sldMasterIdLst>
+  <p:notesMasterIdLst>
+    <p:notesMasterId r:id="rId13"/>
+  </p:notesMasterIdLst>
   <p:sldIdLst>
     <p:sldId id="257" r:id="rId2"/>
     <p:sldId id="258" r:id="rId3"/>
@@ -11,8 +14,8 @@
     <p:sldId id="261" r:id="rId5"/>
     <p:sldId id="265" r:id="rId6"/>
     <p:sldId id="259" r:id="rId7"/>
-    <p:sldId id="267" r:id="rId8"/>
-    <p:sldId id="263" r:id="rId9"/>
+    <p:sldId id="263" r:id="rId8"/>
+    <p:sldId id="267" r:id="rId9"/>
     <p:sldId id="264" r:id="rId10"/>
     <p:sldId id="266" r:id="rId11"/>
     <p:sldId id="268" r:id="rId12"/>
@@ -115,6 +118,439 @@
     </a:lvl9pPr>
   </p:defaultTextStyle>
 </p:presentation>
+</file>
+
+<file path=ppt/notesMasters/notesMaster1.xml><?xml version="1.0" encoding="utf-8"?>
+<p:notesMaster xmlns:a="http://schemas.openxmlformats.org/drawingml/2006/main" xmlns:r="http://schemas.openxmlformats.org/officeDocument/2006/relationships" xmlns:p="http://schemas.openxmlformats.org/presentationml/2006/main">
+  <p:cSld>
+    <p:bg>
+      <p:bgRef idx="1001">
+        <a:schemeClr val="bg1"/>
+      </p:bgRef>
+    </p:bg>
+    <p:spTree>
+      <p:nvGrpSpPr>
+        <p:cNvPr id="1" name=""/>
+        <p:cNvGrpSpPr/>
+        <p:nvPr/>
+      </p:nvGrpSpPr>
+      <p:grpSpPr>
+        <a:xfrm>
+          <a:off x="0" y="0"/>
+          <a:ext cx="0" cy="0"/>
+          <a:chOff x="0" y="0"/>
+          <a:chExt cx="0" cy="0"/>
+        </a:xfrm>
+      </p:grpSpPr>
+      <p:sp>
+        <p:nvSpPr>
+          <p:cNvPr id="2" name="Header Placeholder 1"/>
+          <p:cNvSpPr>
+            <a:spLocks noGrp="1"/>
+          </p:cNvSpPr>
+          <p:nvPr>
+            <p:ph type="hdr" sz="quarter"/>
+          </p:nvPr>
+        </p:nvSpPr>
+        <p:spPr>
+          <a:xfrm>
+            <a:off x="0" y="0"/>
+            <a:ext cx="2971800" cy="458788"/>
+          </a:xfrm>
+          <a:prstGeom prst="rect">
+            <a:avLst/>
+          </a:prstGeom>
+        </p:spPr>
+        <p:txBody>
+          <a:bodyPr vert="horz" lIns="91440" tIns="45720" rIns="91440" bIns="45720" rtlCol="0"/>
+          <a:lstStyle>
+            <a:lvl1pPr algn="l">
+              <a:defRPr sz="1200"/>
+            </a:lvl1pPr>
+          </a:lstStyle>
+          <a:p>
+            <a:endParaRPr lang="en-US"/>
+          </a:p>
+        </p:txBody>
+      </p:sp>
+      <p:sp>
+        <p:nvSpPr>
+          <p:cNvPr id="3" name="Date Placeholder 2"/>
+          <p:cNvSpPr>
+            <a:spLocks noGrp="1"/>
+          </p:cNvSpPr>
+          <p:nvPr>
+            <p:ph type="dt" idx="1"/>
+          </p:nvPr>
+        </p:nvSpPr>
+        <p:spPr>
+          <a:xfrm>
+            <a:off x="3884613" y="0"/>
+            <a:ext cx="2971800" cy="458788"/>
+          </a:xfrm>
+          <a:prstGeom prst="rect">
+            <a:avLst/>
+          </a:prstGeom>
+        </p:spPr>
+        <p:txBody>
+          <a:bodyPr vert="horz" lIns="91440" tIns="45720" rIns="91440" bIns="45720" rtlCol="0"/>
+          <a:lstStyle>
+            <a:lvl1pPr algn="r">
+              <a:defRPr sz="1200"/>
+            </a:lvl1pPr>
+          </a:lstStyle>
+          <a:p>
+            <a:fld id="{547B1AA4-F28E-E74F-8275-04A5CC593410}" type="datetimeFigureOut">
+              <a:rPr lang="en-US" smtClean="0"/>
+              <a:t>4/7/21</a:t>
+            </a:fld>
+            <a:endParaRPr lang="en-US"/>
+          </a:p>
+        </p:txBody>
+      </p:sp>
+      <p:sp>
+        <p:nvSpPr>
+          <p:cNvPr id="4" name="Slide Image Placeholder 3"/>
+          <p:cNvSpPr>
+            <a:spLocks noGrp="1" noRot="1" noChangeAspect="1"/>
+          </p:cNvSpPr>
+          <p:nvPr>
+            <p:ph type="sldImg" idx="2"/>
+          </p:nvPr>
+        </p:nvSpPr>
+        <p:spPr>
+          <a:xfrm>
+            <a:off x="685800" y="1143000"/>
+            <a:ext cx="5486400" cy="3086100"/>
+          </a:xfrm>
+          <a:prstGeom prst="rect">
+            <a:avLst/>
+          </a:prstGeom>
+          <a:noFill/>
+          <a:ln w="12700">
+            <a:solidFill>
+              <a:prstClr val="black"/>
+            </a:solidFill>
+          </a:ln>
+        </p:spPr>
+        <p:txBody>
+          <a:bodyPr vert="horz" lIns="91440" tIns="45720" rIns="91440" bIns="45720" rtlCol="0" anchor="ctr"/>
+          <a:lstStyle/>
+          <a:p>
+            <a:endParaRPr lang="en-US"/>
+          </a:p>
+        </p:txBody>
+      </p:sp>
+      <p:sp>
+        <p:nvSpPr>
+          <p:cNvPr id="5" name="Notes Placeholder 4"/>
+          <p:cNvSpPr>
+            <a:spLocks noGrp="1"/>
+          </p:cNvSpPr>
+          <p:nvPr>
+            <p:ph type="body" sz="quarter" idx="3"/>
+          </p:nvPr>
+        </p:nvSpPr>
+        <p:spPr>
+          <a:xfrm>
+            <a:off x="685800" y="4400550"/>
+            <a:ext cx="5486400" cy="3600450"/>
+          </a:xfrm>
+          <a:prstGeom prst="rect">
+            <a:avLst/>
+          </a:prstGeom>
+        </p:spPr>
+        <p:txBody>
+          <a:bodyPr vert="horz" lIns="91440" tIns="45720" rIns="91440" bIns="45720" rtlCol="0"/>
+          <a:lstStyle/>
+          <a:p>
+            <a:pPr lvl="0"/>
+            <a:r>
+              <a:rPr lang="en-US"/>
+              <a:t>Click to edit Master text styles</a:t>
+            </a:r>
+          </a:p>
+          <a:p>
+            <a:pPr lvl="1"/>
+            <a:r>
+              <a:rPr lang="en-US"/>
+              <a:t>Second level</a:t>
+            </a:r>
+          </a:p>
+          <a:p>
+            <a:pPr lvl="2"/>
+            <a:r>
+              <a:rPr lang="en-US"/>
+              <a:t>Third level</a:t>
+            </a:r>
+          </a:p>
+          <a:p>
+            <a:pPr lvl="3"/>
+            <a:r>
+              <a:rPr lang="en-US"/>
+              <a:t>Fourth level</a:t>
+            </a:r>
+          </a:p>
+          <a:p>
+            <a:pPr lvl="4"/>
+            <a:r>
+              <a:rPr lang="en-US"/>
+              <a:t>Fifth level</a:t>
+            </a:r>
+          </a:p>
+        </p:txBody>
+      </p:sp>
+      <p:sp>
+        <p:nvSpPr>
+          <p:cNvPr id="6" name="Footer Placeholder 5"/>
+          <p:cNvSpPr>
+            <a:spLocks noGrp="1"/>
+          </p:cNvSpPr>
+          <p:nvPr>
+            <p:ph type="ftr" sz="quarter" idx="4"/>
+          </p:nvPr>
+        </p:nvSpPr>
+        <p:spPr>
+          <a:xfrm>
+            <a:off x="0" y="8685213"/>
+            <a:ext cx="2971800" cy="458787"/>
+          </a:xfrm>
+          <a:prstGeom prst="rect">
+            <a:avLst/>
+          </a:prstGeom>
+        </p:spPr>
+        <p:txBody>
+          <a:bodyPr vert="horz" lIns="91440" tIns="45720" rIns="91440" bIns="45720" rtlCol="0" anchor="b"/>
+          <a:lstStyle>
+            <a:lvl1pPr algn="l">
+              <a:defRPr sz="1200"/>
+            </a:lvl1pPr>
+          </a:lstStyle>
+          <a:p>
+            <a:endParaRPr lang="en-US"/>
+          </a:p>
+        </p:txBody>
+      </p:sp>
+      <p:sp>
+        <p:nvSpPr>
+          <p:cNvPr id="7" name="Slide Number Placeholder 6"/>
+          <p:cNvSpPr>
+            <a:spLocks noGrp="1"/>
+          </p:cNvSpPr>
+          <p:nvPr>
+            <p:ph type="sldNum" sz="quarter" idx="5"/>
+          </p:nvPr>
+        </p:nvSpPr>
+        <p:spPr>
+          <a:xfrm>
+            <a:off x="3884613" y="8685213"/>
+            <a:ext cx="2971800" cy="458787"/>
+          </a:xfrm>
+          <a:prstGeom prst="rect">
+            <a:avLst/>
+          </a:prstGeom>
+        </p:spPr>
+        <p:txBody>
+          <a:bodyPr vert="horz" lIns="91440" tIns="45720" rIns="91440" bIns="45720" rtlCol="0" anchor="b"/>
+          <a:lstStyle>
+            <a:lvl1pPr algn="r">
+              <a:defRPr sz="1200"/>
+            </a:lvl1pPr>
+          </a:lstStyle>
+          <a:p>
+            <a:fld id="{021C70A6-D561-2B45-999F-817A0576ABB1}" type="slidenum">
+              <a:rPr lang="en-US" smtClean="0"/>
+              <a:t>‹#›</a:t>
+            </a:fld>
+            <a:endParaRPr lang="en-US"/>
+          </a:p>
+        </p:txBody>
+      </p:sp>
+    </p:spTree>
+    <p:extLst>
+      <p:ext uri="{BB962C8B-B14F-4D97-AF65-F5344CB8AC3E}">
+        <p14:creationId xmlns:p14="http://schemas.microsoft.com/office/powerpoint/2010/main" val="2627810117"/>
+      </p:ext>
+    </p:extLst>
+  </p:cSld>
+  <p:clrMap bg1="lt1" tx1="dk1" bg2="lt2" tx2="dk2" accent1="accent1" accent2="accent2" accent3="accent3" accent4="accent4" accent5="accent5" accent6="accent6" hlink="hlink" folHlink="folHlink"/>
+  <p:notesStyle>
+    <a:lvl1pPr marL="0" algn="l" defTabSz="914400" rtl="0" eaLnBrk="1" latinLnBrk="0" hangingPunct="1">
+      <a:defRPr sz="1200" kern="1200">
+        <a:solidFill>
+          <a:schemeClr val="tx1"/>
+        </a:solidFill>
+        <a:latin typeface="+mn-lt"/>
+        <a:ea typeface="+mn-ea"/>
+        <a:cs typeface="+mn-cs"/>
+      </a:defRPr>
+    </a:lvl1pPr>
+    <a:lvl2pPr marL="457200" algn="l" defTabSz="914400" rtl="0" eaLnBrk="1" latinLnBrk="0" hangingPunct="1">
+      <a:defRPr sz="1200" kern="1200">
+        <a:solidFill>
+          <a:schemeClr val="tx1"/>
+        </a:solidFill>
+        <a:latin typeface="+mn-lt"/>
+        <a:ea typeface="+mn-ea"/>
+        <a:cs typeface="+mn-cs"/>
+      </a:defRPr>
+    </a:lvl2pPr>
+    <a:lvl3pPr marL="914400" algn="l" defTabSz="914400" rtl="0" eaLnBrk="1" latinLnBrk="0" hangingPunct="1">
+      <a:defRPr sz="1200" kern="1200">
+        <a:solidFill>
+          <a:schemeClr val="tx1"/>
+        </a:solidFill>
+        <a:latin typeface="+mn-lt"/>
+        <a:ea typeface="+mn-ea"/>
+        <a:cs typeface="+mn-cs"/>
+      </a:defRPr>
+    </a:lvl3pPr>
+    <a:lvl4pPr marL="1371600" algn="l" defTabSz="914400" rtl="0" eaLnBrk="1" latinLnBrk="0" hangingPunct="1">
+      <a:defRPr sz="1200" kern="1200">
+        <a:solidFill>
+          <a:schemeClr val="tx1"/>
+        </a:solidFill>
+        <a:latin typeface="+mn-lt"/>
+        <a:ea typeface="+mn-ea"/>
+        <a:cs typeface="+mn-cs"/>
+      </a:defRPr>
+    </a:lvl4pPr>
+    <a:lvl5pPr marL="1828800" algn="l" defTabSz="914400" rtl="0" eaLnBrk="1" latinLnBrk="0" hangingPunct="1">
+      <a:defRPr sz="1200" kern="1200">
+        <a:solidFill>
+          <a:schemeClr val="tx1"/>
+        </a:solidFill>
+        <a:latin typeface="+mn-lt"/>
+        <a:ea typeface="+mn-ea"/>
+        <a:cs typeface="+mn-cs"/>
+      </a:defRPr>
+    </a:lvl5pPr>
+    <a:lvl6pPr marL="2286000" algn="l" defTabSz="914400" rtl="0" eaLnBrk="1" latinLnBrk="0" hangingPunct="1">
+      <a:defRPr sz="1200" kern="1200">
+        <a:solidFill>
+          <a:schemeClr val="tx1"/>
+        </a:solidFill>
+        <a:latin typeface="+mn-lt"/>
+        <a:ea typeface="+mn-ea"/>
+        <a:cs typeface="+mn-cs"/>
+      </a:defRPr>
+    </a:lvl6pPr>
+    <a:lvl7pPr marL="2743200" algn="l" defTabSz="914400" rtl="0" eaLnBrk="1" latinLnBrk="0" hangingPunct="1">
+      <a:defRPr sz="1200" kern="1200">
+        <a:solidFill>
+          <a:schemeClr val="tx1"/>
+        </a:solidFill>
+        <a:latin typeface="+mn-lt"/>
+        <a:ea typeface="+mn-ea"/>
+        <a:cs typeface="+mn-cs"/>
+      </a:defRPr>
+    </a:lvl7pPr>
+    <a:lvl8pPr marL="3200400" algn="l" defTabSz="914400" rtl="0" eaLnBrk="1" latinLnBrk="0" hangingPunct="1">
+      <a:defRPr sz="1200" kern="1200">
+        <a:solidFill>
+          <a:schemeClr val="tx1"/>
+        </a:solidFill>
+        <a:latin typeface="+mn-lt"/>
+        <a:ea typeface="+mn-ea"/>
+        <a:cs typeface="+mn-cs"/>
+      </a:defRPr>
+    </a:lvl8pPr>
+    <a:lvl9pPr marL="3657600" algn="l" defTabSz="914400" rtl="0" eaLnBrk="1" latinLnBrk="0" hangingPunct="1">
+      <a:defRPr sz="1200" kern="1200">
+        <a:solidFill>
+          <a:schemeClr val="tx1"/>
+        </a:solidFill>
+        <a:latin typeface="+mn-lt"/>
+        <a:ea typeface="+mn-ea"/>
+        <a:cs typeface="+mn-cs"/>
+      </a:defRPr>
+    </a:lvl9pPr>
+  </p:notesStyle>
+</p:notesMaster>
+</file>
+
+<file path=ppt/notesSlides/notesSlide1.xml><?xml version="1.0" encoding="utf-8"?>
+<p:notes xmlns:a="http://schemas.openxmlformats.org/drawingml/2006/main" xmlns:r="http://schemas.openxmlformats.org/officeDocument/2006/relationships" xmlns:p="http://schemas.openxmlformats.org/presentationml/2006/main">
+  <p:cSld>
+    <p:spTree>
+      <p:nvGrpSpPr>
+        <p:cNvPr id="1" name=""/>
+        <p:cNvGrpSpPr/>
+        <p:nvPr/>
+      </p:nvGrpSpPr>
+      <p:grpSpPr>
+        <a:xfrm>
+          <a:off x="0" y="0"/>
+          <a:ext cx="0" cy="0"/>
+          <a:chOff x="0" y="0"/>
+          <a:chExt cx="0" cy="0"/>
+        </a:xfrm>
+      </p:grpSpPr>
+      <p:sp>
+        <p:nvSpPr>
+          <p:cNvPr id="2" name="Slide Image Placeholder 1"/>
+          <p:cNvSpPr>
+            <a:spLocks noGrp="1" noRot="1" noChangeAspect="1"/>
+          </p:cNvSpPr>
+          <p:nvPr>
+            <p:ph type="sldImg"/>
+          </p:nvPr>
+        </p:nvSpPr>
+        <p:spPr/>
+      </p:sp>
+      <p:sp>
+        <p:nvSpPr>
+          <p:cNvPr id="3" name="Notes Placeholder 2"/>
+          <p:cNvSpPr>
+            <a:spLocks noGrp="1"/>
+          </p:cNvSpPr>
+          <p:nvPr>
+            <p:ph type="body" idx="1"/>
+          </p:nvPr>
+        </p:nvSpPr>
+        <p:spPr/>
+        <p:txBody>
+          <a:bodyPr/>
+          <a:lstStyle/>
+          <a:p>
+            <a:endParaRPr lang="en-US" dirty="0"/>
+          </a:p>
+        </p:txBody>
+      </p:sp>
+      <p:sp>
+        <p:nvSpPr>
+          <p:cNvPr id="4" name="Slide Number Placeholder 3"/>
+          <p:cNvSpPr>
+            <a:spLocks noGrp="1"/>
+          </p:cNvSpPr>
+          <p:nvPr>
+            <p:ph type="sldNum" sz="quarter" idx="5"/>
+          </p:nvPr>
+        </p:nvSpPr>
+        <p:spPr/>
+        <p:txBody>
+          <a:bodyPr/>
+          <a:lstStyle/>
+          <a:p>
+            <a:fld id="{021C70A6-D561-2B45-999F-817A0576ABB1}" type="slidenum">
+              <a:rPr lang="en-US" smtClean="0"/>
+              <a:t>10</a:t>
+            </a:fld>
+            <a:endParaRPr lang="en-US"/>
+          </a:p>
+        </p:txBody>
+      </p:sp>
+    </p:spTree>
+    <p:extLst>
+      <p:ext uri="{BB962C8B-B14F-4D97-AF65-F5344CB8AC3E}">
+        <p14:creationId xmlns:p14="http://schemas.microsoft.com/office/powerpoint/2010/main" val="1683146566"/>
+      </p:ext>
+    </p:extLst>
+  </p:cSld>
+  <p:clrMapOvr>
+    <a:masterClrMapping/>
+  </p:clrMapOvr>
+</p:notes>
 </file>
 
 <file path=ppt/slideLayouts/slideLayout1.xml><?xml version="1.0" encoding="utf-8"?>
@@ -4023,7 +4459,7 @@
                 <a:ea typeface="CMU Serif Roman" panose="02000603000000000000" pitchFamily="2" charset="0"/>
                 <a:cs typeface="CMU Serif Roman" panose="02000603000000000000" pitchFamily="2" charset="0"/>
               </a:rPr>
-              <a:t>Split data into seasons and fit random forest </a:t>
+              <a:t>Split data into seasons and do separate regressions [1]</a:t>
             </a:r>
           </a:p>
           <a:p>
@@ -4033,7 +4469,7 @@
                 <a:ea typeface="CMU Serif Roman" panose="02000603000000000000" pitchFamily="2" charset="0"/>
                 <a:cs typeface="CMU Serif Roman" panose="02000603000000000000" pitchFamily="2" charset="0"/>
               </a:rPr>
-              <a:t>Previous average for hour of day</a:t>
+              <a:t>Rolling average based on hour of day [2]</a:t>
             </a:r>
           </a:p>
           <a:p>
@@ -4043,7 +4479,17 @@
                 <a:ea typeface="CMU Serif Roman" panose="02000603000000000000" pitchFamily="2" charset="0"/>
                 <a:cs typeface="CMU Serif Roman" panose="02000603000000000000" pitchFamily="2" charset="0"/>
               </a:rPr>
-              <a:t>PCA (if time) </a:t>
+              <a:t>PCA (if time) [3]</a:t>
+            </a:r>
+          </a:p>
+          <a:p>
+            <a:r>
+              <a:rPr lang="en-US" dirty="0">
+                <a:latin typeface="CMU Serif Roman" panose="02000603000000000000" pitchFamily="2" charset="0"/>
+                <a:ea typeface="CMU Serif Roman" panose="02000603000000000000" pitchFamily="2" charset="0"/>
+                <a:cs typeface="CMU Serif Roman" panose="02000603000000000000" pitchFamily="2" charset="0"/>
+              </a:rPr>
+              <a:t>Add Evaluation metrics of RMSE, and MAE [1, 2, 3]</a:t>
             </a:r>
           </a:p>
           <a:p>
@@ -4170,27 +4616,115 @@
                 <a:ea typeface="CMU Serif Roman" panose="02000603000000000000" pitchFamily="2" charset="0"/>
                 <a:cs typeface="CMU Serif Roman" panose="02000603000000000000" pitchFamily="2" charset="0"/>
               </a:rPr>
-              <a:t>“Solar Power Forecasting with Machine Learning Techniques”</a:t>
-            </a:r>
-          </a:p>
-          <a:p>
+              <a:t>[1] </a:t>
+            </a:r>
             <a:r>
               <a:rPr lang="en-US" dirty="0">
                 <a:latin typeface="CMU Serif Roman" panose="02000603000000000000" pitchFamily="2" charset="0"/>
                 <a:ea typeface="CMU Serif Roman" panose="02000603000000000000" pitchFamily="2" charset="0"/>
                 <a:cs typeface="CMU Serif Roman" panose="02000603000000000000" pitchFamily="2" charset="0"/>
               </a:rPr>
-              <a:t>“Deep Learning for Big Data Time Series Forecasting Applied to Solar Power”</a:t>
-            </a:r>
-          </a:p>
-          <a:p>
+              <a:t>E. </a:t>
+            </a:r>
             <a:r>
               <a:rPr lang="en-US" dirty="0">
                 <a:latin typeface="CMU Serif Roman" panose="02000603000000000000" pitchFamily="2" charset="0"/>
                 <a:ea typeface="CMU Serif Roman" panose="02000603000000000000" pitchFamily="2" charset="0"/>
                 <a:cs typeface="CMU Serif Roman" panose="02000603000000000000" pitchFamily="2" charset="0"/>
               </a:rPr>
-              <a:t>“Forecasting of Solar Energy with Application for a Growing Economy Like India: Survey and Implication” </a:t>
+              <a:t>Isaksson, </a:t>
+            </a:r>
+            <a:r>
+              <a:rPr lang="en-US" dirty="0">
+                <a:latin typeface="CMU Serif Roman" panose="02000603000000000000" pitchFamily="2" charset="0"/>
+                <a:ea typeface="CMU Serif Roman" panose="02000603000000000000" pitchFamily="2" charset="0"/>
+                <a:cs typeface="CMU Serif Roman" panose="02000603000000000000" pitchFamily="2" charset="0"/>
+              </a:rPr>
+              <a:t>M.</a:t>
+            </a:r>
+            <a:r>
+              <a:rPr lang="en-US" dirty="0">
+                <a:latin typeface="CMU Serif Roman" panose="02000603000000000000" pitchFamily="2" charset="0"/>
+                <a:ea typeface="CMU Serif Roman" panose="02000603000000000000" pitchFamily="2" charset="0"/>
+                <a:cs typeface="CMU Serif Roman" panose="02000603000000000000" pitchFamily="2" charset="0"/>
+              </a:rPr>
+              <a:t> Conde. “</a:t>
+            </a:r>
+            <a:r>
+              <a:rPr lang="en-US" i="1" dirty="0">
+                <a:latin typeface="CMU SERIF ROMAN" panose="02000603000000000000" pitchFamily="2" charset="0"/>
+                <a:ea typeface="CMU SERIF ROMAN" panose="02000603000000000000" pitchFamily="2" charset="0"/>
+                <a:cs typeface="CMU SERIF ROMAN" panose="02000603000000000000" pitchFamily="2" charset="0"/>
+              </a:rPr>
+              <a:t>Solar Power Forecasting with Machine Learning Techniques”. </a:t>
+            </a:r>
+            <a:r>
+              <a:rPr lang="en-US" dirty="0">
+                <a:latin typeface="CMU Serif Roman" panose="02000603000000000000" pitchFamily="2" charset="0"/>
+                <a:ea typeface="CMU Serif Roman" panose="02000603000000000000" pitchFamily="2" charset="0"/>
+                <a:cs typeface="CMU Serif Roman" panose="02000603000000000000" pitchFamily="2" charset="0"/>
+              </a:rPr>
+              <a:t>2018.</a:t>
+            </a:r>
+          </a:p>
+          <a:p>
+            <a:r>
+              <a:rPr lang="en-US" dirty="0">
+                <a:latin typeface="CMU Serif Roman" panose="02000603000000000000" pitchFamily="2" charset="0"/>
+                <a:ea typeface="CMU Serif Roman" panose="02000603000000000000" pitchFamily="2" charset="0"/>
+                <a:cs typeface="CMU Serif Roman" panose="02000603000000000000" pitchFamily="2" charset="0"/>
+              </a:rPr>
+              <a:t>[2] </a:t>
+            </a:r>
+            <a:r>
+              <a:rPr lang="en-US" dirty="0">
+                <a:latin typeface="CMU Serif Roman" panose="02000603000000000000" pitchFamily="2" charset="0"/>
+                <a:ea typeface="CMU Serif Roman" panose="02000603000000000000" pitchFamily="2" charset="0"/>
+                <a:cs typeface="CMU Serif Roman" panose="02000603000000000000" pitchFamily="2" charset="0"/>
+              </a:rPr>
+              <a:t>J. </a:t>
+            </a:r>
+            <a:r>
+              <a:rPr lang="en-US" dirty="0">
+                <a:latin typeface="CMU Serif Roman" panose="02000603000000000000" pitchFamily="2" charset="0"/>
+                <a:ea typeface="CMU Serif Roman" panose="02000603000000000000" pitchFamily="2" charset="0"/>
+                <a:cs typeface="CMU Serif Roman" panose="02000603000000000000" pitchFamily="2" charset="0"/>
+              </a:rPr>
+              <a:t>Torres, et al. </a:t>
+            </a:r>
+            <a:r>
+              <a:rPr lang="en-US" i="1" dirty="0">
+                <a:latin typeface="CMU SERIF ROMAN" panose="02000603000000000000" pitchFamily="2" charset="0"/>
+                <a:ea typeface="CMU SERIF ROMAN" panose="02000603000000000000" pitchFamily="2" charset="0"/>
+                <a:cs typeface="CMU SERIF ROMAN" panose="02000603000000000000" pitchFamily="2" charset="0"/>
+              </a:rPr>
+              <a:t>“Deep Learning for Big Data Time Series Forecasting Applied to Solar Power”. </a:t>
+            </a:r>
+            <a:r>
+              <a:rPr lang="en-US" dirty="0">
+                <a:latin typeface="CMU Serif Roman" panose="02000603000000000000" pitchFamily="2" charset="0"/>
+                <a:ea typeface="CMU Serif Roman" panose="02000603000000000000" pitchFamily="2" charset="0"/>
+                <a:cs typeface="CMU Serif Roman" panose="02000603000000000000" pitchFamily="2" charset="0"/>
+              </a:rPr>
+              <a:t>Advances in Intelligent systems and Computing. 2019.</a:t>
+            </a:r>
+          </a:p>
+          <a:p>
+            <a:r>
+              <a:rPr lang="en-US" i="1" dirty="0">
+                <a:latin typeface="CMU SERIF ROMAN" panose="02000603000000000000" pitchFamily="2" charset="0"/>
+                <a:ea typeface="CMU SERIF ROMAN" panose="02000603000000000000" pitchFamily="2" charset="0"/>
+                <a:cs typeface="CMU SERIF ROMAN" panose="02000603000000000000" pitchFamily="2" charset="0"/>
+              </a:rPr>
+              <a:t>[3] “Forecasting of Solar Energy with Application for a Growing Economy Like India: Survey and Implication”. </a:t>
+            </a:r>
+            <a:r>
+              <a:rPr lang="en-US" dirty="0">
+                <a:latin typeface="CMU Serif Roman" panose="02000603000000000000" pitchFamily="2" charset="0"/>
+                <a:ea typeface="CMU Serif Roman" panose="02000603000000000000" pitchFamily="2" charset="0"/>
+                <a:cs typeface="CMU Serif Roman" panose="02000603000000000000" pitchFamily="2" charset="0"/>
+              </a:rPr>
+              <a:t>Renewable and Sustainable Energy Reviews. 2017.</a:t>
             </a:r>
           </a:p>
           <a:p>
@@ -8222,7 +8756,7 @@
         <p:spPr>
           <a:xfrm>
             <a:off x="210870" y="3306894"/>
-            <a:ext cx="2862160" cy="2308324"/>
+            <a:ext cx="2827913" cy="2657191"/>
           </a:xfrm>
           <a:prstGeom prst="rect">
             <a:avLst/>
@@ -8259,6 +8793,33 @@
                 <a:ea typeface="CMU Serif Roman" panose="02000603000000000000" pitchFamily="2" charset="0"/>
                 <a:cs typeface="CMU Serif Roman" panose="02000603000000000000" pitchFamily="2" charset="0"/>
               </a:rPr>
+              <a:t>Transformed input data with </a:t>
+            </a:r>
+            <a:r>
+              <a:rPr lang="en-US" dirty="0" err="1">
+                <a:latin typeface="CMU Serif Roman" panose="02000603000000000000" pitchFamily="2" charset="0"/>
+                <a:ea typeface="CMU Serif Roman" panose="02000603000000000000" pitchFamily="2" charset="0"/>
+                <a:cs typeface="CMU Serif Roman" panose="02000603000000000000" pitchFamily="2" charset="0"/>
+              </a:rPr>
+              <a:t>MinMaxScaler</a:t>
+            </a:r>
+            <a:endParaRPr lang="en-US" dirty="0">
+              <a:latin typeface="CMU Serif Roman" panose="02000603000000000000" pitchFamily="2" charset="0"/>
+              <a:ea typeface="CMU Serif Roman" panose="02000603000000000000" pitchFamily="2" charset="0"/>
+              <a:cs typeface="CMU Serif Roman" panose="02000603000000000000" pitchFamily="2" charset="0"/>
+            </a:endParaRPr>
+          </a:p>
+          <a:p>
+            <a:pPr marL="285750" indent="-285750">
+              <a:buFont typeface="Arial" panose="020B0604020202020204" pitchFamily="34" charset="0"/>
+              <a:buChar char="•"/>
+            </a:pPr>
+            <a:r>
+              <a:rPr lang="en-US" dirty="0">
+                <a:latin typeface="CMU Serif Roman" panose="02000603000000000000" pitchFamily="2" charset="0"/>
+                <a:ea typeface="CMU Serif Roman" panose="02000603000000000000" pitchFamily="2" charset="0"/>
+                <a:cs typeface="CMU Serif Roman" panose="02000603000000000000" pitchFamily="2" charset="0"/>
+              </a:rPr>
               <a:t>Transformed using </a:t>
             </a:r>
             <a:r>
@@ -8269,36 +8830,6 @@
               </a:rPr>
               <a:t>QuantileTransformer</a:t>
             </a:r>
-            <a:r>
-              <a:rPr lang="en-US" dirty="0">
-                <a:latin typeface="CMU Serif Roman" panose="02000603000000000000" pitchFamily="2" charset="0"/>
-                <a:ea typeface="CMU Serif Roman" panose="02000603000000000000" pitchFamily="2" charset="0"/>
-                <a:cs typeface="CMU Serif Roman" panose="02000603000000000000" pitchFamily="2" charset="0"/>
-              </a:rPr>
-              <a:t> in </a:t>
-            </a:r>
-            <a:r>
-              <a:rPr lang="en-US" dirty="0" err="1">
-                <a:latin typeface="CMU Serif Roman" panose="02000603000000000000" pitchFamily="2" charset="0"/>
-                <a:ea typeface="CMU Serif Roman" panose="02000603000000000000" pitchFamily="2" charset="0"/>
-                <a:cs typeface="CMU Serif Roman" panose="02000603000000000000" pitchFamily="2" charset="0"/>
-              </a:rPr>
-              <a:t>sklearn</a:t>
-            </a:r>
-            <a:r>
-              <a:rPr lang="en-US" dirty="0">
-                <a:latin typeface="CMU Serif Roman" panose="02000603000000000000" pitchFamily="2" charset="0"/>
-                <a:ea typeface="CMU Serif Roman" panose="02000603000000000000" pitchFamily="2" charset="0"/>
-                <a:cs typeface="CMU Serif Roman" panose="02000603000000000000" pitchFamily="2" charset="0"/>
-              </a:rPr>
-              <a:t> </a:t>
-            </a:r>
-          </a:p>
-          <a:p>
-            <a:pPr marL="285750" indent="-285750">
-              <a:buFont typeface="Arial" panose="020B0604020202020204" pitchFamily="34" charset="0"/>
-              <a:buChar char="•"/>
-            </a:pPr>
             <a:endParaRPr lang="en-US" dirty="0">
               <a:latin typeface="CMU Serif Roman" panose="02000603000000000000" pitchFamily="2" charset="0"/>
               <a:ea typeface="CMU Serif Roman" panose="02000603000000000000" pitchFamily="2" charset="0"/>
@@ -8612,8 +9143,8 @@
         </p:nvSpPr>
         <p:spPr>
           <a:xfrm>
-            <a:off x="863128" y="2376210"/>
-            <a:ext cx="4959603" cy="3522569"/>
+            <a:off x="437930" y="2008753"/>
+            <a:ext cx="5269187" cy="3980338"/>
           </a:xfrm>
           <a:prstGeom prst="rect">
             <a:avLst/>
@@ -8737,7 +9268,7 @@
                 <a:ea typeface="CMU Serif Roman" panose="02000603000000000000" pitchFamily="2" charset="0"/>
                 <a:cs typeface="CMU Serif Roman" panose="02000603000000000000" pitchFamily="2" charset="0"/>
               </a:rPr>
-              <a:t> 0.001, batch size 128, epochs 100, dropout 0.2</a:t>
+              <a:t> 0.001, batch size 128, epochs 250, dropout 0.2</a:t>
             </a:r>
           </a:p>
           <a:p>
@@ -8793,7 +9324,7 @@
                 <a:ea typeface="CMU Serif Roman" panose="02000603000000000000" pitchFamily="2" charset="0"/>
                 <a:cs typeface="CMU Serif Roman" panose="02000603000000000000" pitchFamily="2" charset="0"/>
               </a:rPr>
-              <a:t> 0.001, batch size 50, epochs 100, dropout 0.2</a:t>
+              <a:t> 0.001, batch size 50, epochs 400, dropout 0.2</a:t>
             </a:r>
           </a:p>
           <a:p>
@@ -8996,7 +9527,7 @@
                 <p:ph idx="1"/>
                 <p:extLst>
                   <p:ext uri="{D42A27DB-BD31-4B8C-83A1-F6EECF244321}">
-                    <p14:modId xmlns:p14="http://schemas.microsoft.com/office/powerpoint/2010/main" val="3278725376"/>
+                    <p14:modId xmlns:p14="http://schemas.microsoft.com/office/powerpoint/2010/main" val="2167737609"/>
                   </p:ext>
                 </p:extLst>
               </p:nvPr>
@@ -9198,7 +9729,7 @@
                               <a:ea typeface="CMU Serif Roman" panose="02000603000000000000" pitchFamily="2" charset="0"/>
                               <a:cs typeface="CMU Serif Roman" panose="02000603000000000000" pitchFamily="2" charset="0"/>
                             </a:rPr>
-                            <a:t>0.762</a:t>
+                            <a:t>0.761</a:t>
                           </a:r>
                         </a:p>
                       </a:txBody>
@@ -9215,7 +9746,7 @@
                               <a:ea typeface="CMU Serif Roman" panose="02000603000000000000" pitchFamily="2" charset="0"/>
                               <a:cs typeface="CMU Serif Roman" panose="02000603000000000000" pitchFamily="2" charset="0"/>
                             </a:rPr>
-                            <a:t>0.333</a:t>
+                            <a:t>0.337</a:t>
                           </a:r>
                         </a:p>
                       </a:txBody>
@@ -9273,7 +9804,7 @@
                               <a:ea typeface="CMU Serif Roman" panose="02000603000000000000" pitchFamily="2" charset="0"/>
                               <a:cs typeface="CMU Serif Roman" panose="02000603000000000000" pitchFamily="2" charset="0"/>
                             </a:rPr>
-                            <a:t>0.499</a:t>
+                            <a:t>0.484</a:t>
                           </a:r>
                         </a:p>
                       </a:txBody>
@@ -9331,7 +9862,7 @@
                               <a:ea typeface="CMU Serif Roman" panose="02000603000000000000" pitchFamily="2" charset="0"/>
                               <a:cs typeface="CMU Serif Roman" panose="02000603000000000000" pitchFamily="2" charset="0"/>
                             </a:rPr>
-                            <a:t>0.486</a:t>
+                            <a:t>0.496</a:t>
                           </a:r>
                         </a:p>
                       </a:txBody>
@@ -9372,7 +9903,7 @@
                               <a:ea typeface="CMU Serif Roman" panose="02000603000000000000" pitchFamily="2" charset="0"/>
                               <a:cs typeface="CMU Serif Roman" panose="02000603000000000000" pitchFamily="2" charset="0"/>
                             </a:rPr>
-                            <a:t>0.458</a:t>
+                            <a:t>0.595</a:t>
                           </a:r>
                         </a:p>
                       </a:txBody>
@@ -9389,7 +9920,7 @@
                               <a:ea typeface="CMU Serif Roman" panose="02000603000000000000" pitchFamily="2" charset="0"/>
                               <a:cs typeface="CMU Serif Roman" panose="02000603000000000000" pitchFamily="2" charset="0"/>
                             </a:rPr>
-                            <a:t>0.3</a:t>
+                            <a:t>0.372</a:t>
                           </a:r>
                         </a:p>
                       </a:txBody>
@@ -9430,7 +9961,7 @@
                               <a:ea typeface="CMU Serif Roman" panose="02000603000000000000" pitchFamily="2" charset="0"/>
                               <a:cs typeface="CMU Serif Roman" panose="02000603000000000000" pitchFamily="2" charset="0"/>
                             </a:rPr>
-                            <a:t>0.693</a:t>
+                            <a:t>0.728</a:t>
                           </a:r>
                         </a:p>
                       </a:txBody>
@@ -9447,7 +9978,7 @@
                               <a:ea typeface="CMU Serif Roman" panose="02000603000000000000" pitchFamily="2" charset="0"/>
                               <a:cs typeface="CMU Serif Roman" panose="02000603000000000000" pitchFamily="2" charset="0"/>
                             </a:rPr>
-                            <a:t>0.472</a:t>
+                            <a:t>0.555</a:t>
                           </a:r>
                         </a:p>
                       </a:txBody>
@@ -9481,7 +10012,7 @@
                 <p:ph idx="1"/>
                 <p:extLst>
                   <p:ext uri="{D42A27DB-BD31-4B8C-83A1-F6EECF244321}">
-                    <p14:modId xmlns:p14="http://schemas.microsoft.com/office/powerpoint/2010/main" val="3278725376"/>
+                    <p14:modId xmlns:p14="http://schemas.microsoft.com/office/powerpoint/2010/main" val="2167737609"/>
                   </p:ext>
                 </p:extLst>
               </p:nvPr>
@@ -9603,7 +10134,7 @@
                               <a:ea typeface="CMU Serif Roman" panose="02000603000000000000" pitchFamily="2" charset="0"/>
                               <a:cs typeface="CMU Serif Roman" panose="02000603000000000000" pitchFamily="2" charset="0"/>
                             </a:rPr>
-                            <a:t>0.762</a:t>
+                            <a:t>0.761</a:t>
                           </a:r>
                         </a:p>
                       </a:txBody>
@@ -9620,7 +10151,7 @@
                               <a:ea typeface="CMU Serif Roman" panose="02000603000000000000" pitchFamily="2" charset="0"/>
                               <a:cs typeface="CMU Serif Roman" panose="02000603000000000000" pitchFamily="2" charset="0"/>
                             </a:rPr>
-                            <a:t>0.333</a:t>
+                            <a:t>0.337</a:t>
                           </a:r>
                         </a:p>
                       </a:txBody>
@@ -9678,7 +10209,7 @@
                               <a:ea typeface="CMU Serif Roman" panose="02000603000000000000" pitchFamily="2" charset="0"/>
                               <a:cs typeface="CMU Serif Roman" panose="02000603000000000000" pitchFamily="2" charset="0"/>
                             </a:rPr>
-                            <a:t>0.499</a:t>
+                            <a:t>0.484</a:t>
                           </a:r>
                         </a:p>
                       </a:txBody>
@@ -9736,7 +10267,7 @@
                               <a:ea typeface="CMU Serif Roman" panose="02000603000000000000" pitchFamily="2" charset="0"/>
                               <a:cs typeface="CMU Serif Roman" panose="02000603000000000000" pitchFamily="2" charset="0"/>
                             </a:rPr>
-                            <a:t>0.486</a:t>
+                            <a:t>0.496</a:t>
                           </a:r>
                         </a:p>
                       </a:txBody>
@@ -9777,7 +10308,7 @@
                               <a:ea typeface="CMU Serif Roman" panose="02000603000000000000" pitchFamily="2" charset="0"/>
                               <a:cs typeface="CMU Serif Roman" panose="02000603000000000000" pitchFamily="2" charset="0"/>
                             </a:rPr>
-                            <a:t>0.458</a:t>
+                            <a:t>0.595</a:t>
                           </a:r>
                         </a:p>
                       </a:txBody>
@@ -9794,7 +10325,7 @@
                               <a:ea typeface="CMU Serif Roman" panose="02000603000000000000" pitchFamily="2" charset="0"/>
                               <a:cs typeface="CMU Serif Roman" panose="02000603000000000000" pitchFamily="2" charset="0"/>
                             </a:rPr>
-                            <a:t>0.3</a:t>
+                            <a:t>0.372</a:t>
                           </a:r>
                         </a:p>
                       </a:txBody>
@@ -9835,7 +10366,7 @@
                               <a:ea typeface="CMU Serif Roman" panose="02000603000000000000" pitchFamily="2" charset="0"/>
                               <a:cs typeface="CMU Serif Roman" panose="02000603000000000000" pitchFamily="2" charset="0"/>
                             </a:rPr>
-                            <a:t>0.693</a:t>
+                            <a:t>0.728</a:t>
                           </a:r>
                         </a:p>
                       </a:txBody>
@@ -9852,7 +10383,7 @@
                               <a:ea typeface="CMU Serif Roman" panose="02000603000000000000" pitchFamily="2" charset="0"/>
                               <a:cs typeface="CMU Serif Roman" panose="02000603000000000000" pitchFamily="2" charset="0"/>
                             </a:rPr>
-                            <a:t>0.472</a:t>
+                            <a:t>0.555</a:t>
                           </a:r>
                         </a:p>
                       </a:txBody>
@@ -9884,6 +10415,206 @@
 </file>
 
 <file path=ppt/slides/slide7.xml><?xml version="1.0" encoding="utf-8"?>
+<p:sld xmlns:a="http://schemas.openxmlformats.org/drawingml/2006/main" xmlns:r="http://schemas.openxmlformats.org/officeDocument/2006/relationships" xmlns:p="http://schemas.openxmlformats.org/presentationml/2006/main">
+  <p:cSld>
+    <p:bg>
+      <p:bgPr>
+        <a:solidFill>
+          <a:schemeClr val="bg1"/>
+        </a:solidFill>
+        <a:effectLst/>
+      </p:bgPr>
+    </p:bg>
+    <p:spTree>
+      <p:nvGrpSpPr>
+        <p:cNvPr id="1" name=""/>
+        <p:cNvGrpSpPr/>
+        <p:nvPr/>
+      </p:nvGrpSpPr>
+      <p:grpSpPr>
+        <a:xfrm>
+          <a:off x="0" y="0"/>
+          <a:ext cx="0" cy="0"/>
+          <a:chOff x="0" y="0"/>
+          <a:chExt cx="0" cy="0"/>
+        </a:xfrm>
+      </p:grpSpPr>
+      <p:sp useBgFill="1">
+        <p:nvSpPr>
+          <p:cNvPr id="28" name="Rectangle 27">
+            <a:extLst>
+              <a:ext uri="{FF2B5EF4-FFF2-40B4-BE49-F238E27FC236}">
+                <a16:creationId xmlns:a16="http://schemas.microsoft.com/office/drawing/2014/main" id="{53F29798-D584-4792-9B62-3F5F5C36D619}"/>
+              </a:ext>
+              <a:ext uri="{C183D7F6-B498-43B3-948B-1728B52AA6E4}">
+                <adec:decorative xmlns:adec="http://schemas.microsoft.com/office/drawing/2017/decorative" val="1"/>
+              </a:ext>
+            </a:extLst>
+          </p:cNvPr>
+          <p:cNvSpPr>
+            <a:spLocks noGrp="1" noRot="1" noChangeAspect="1" noMove="1" noResize="1" noEditPoints="1" noAdjustHandles="1" noChangeArrowheads="1" noChangeShapeType="1" noTextEdit="1"/>
+          </p:cNvSpPr>
+          <p:nvPr>
+            <p:extLst>
+              <p:ext uri="{386F3935-93C4-4BCD-93E2-E3B085C9AB24}">
+                <p16:designElem xmlns:p16="http://schemas.microsoft.com/office/powerpoint/2015/main" val="1"/>
+              </p:ext>
+            </p:extLst>
+          </p:nvPr>
+        </p:nvSpPr>
+        <p:spPr>
+          <a:xfrm>
+            <a:off x="0" y="0"/>
+            <a:ext cx="12188952" cy="6858000"/>
+          </a:xfrm>
+          <a:prstGeom prst="rect">
+            <a:avLst/>
+          </a:prstGeom>
+          <a:ln>
+            <a:noFill/>
+          </a:ln>
+        </p:spPr>
+        <p:style>
+          <a:lnRef idx="2">
+            <a:schemeClr val="accent1">
+              <a:shade val="50000"/>
+            </a:schemeClr>
+          </a:lnRef>
+          <a:fillRef idx="1">
+            <a:schemeClr val="accent1"/>
+          </a:fillRef>
+          <a:effectRef idx="0">
+            <a:schemeClr val="accent1"/>
+          </a:effectRef>
+          <a:fontRef idx="minor">
+            <a:schemeClr val="lt1"/>
+          </a:fontRef>
+        </p:style>
+        <p:txBody>
+          <a:bodyPr rtlCol="0" anchor="ctr"/>
+          <a:lstStyle/>
+          <a:p>
+            <a:pPr algn="ctr"/>
+            <a:endParaRPr lang="en-US"/>
+          </a:p>
+        </p:txBody>
+      </p:sp>
+      <p:pic>
+        <p:nvPicPr>
+          <p:cNvPr id="23" name="Picture 22">
+            <a:extLst>
+              <a:ext uri="{FF2B5EF4-FFF2-40B4-BE49-F238E27FC236}">
+                <a16:creationId xmlns:a16="http://schemas.microsoft.com/office/drawing/2014/main" id="{C68897AF-D845-4A48-BD71-9006CC207575}"/>
+              </a:ext>
+            </a:extLst>
+          </p:cNvPr>
+          <p:cNvPicPr>
+            <a:picLocks noChangeAspect="1"/>
+          </p:cNvPicPr>
+          <p:nvPr/>
+        </p:nvPicPr>
+        <p:blipFill>
+          <a:blip r:embed="rId2"/>
+          <a:stretch>
+            <a:fillRect/>
+          </a:stretch>
+        </p:blipFill>
+        <p:spPr>
+          <a:xfrm>
+            <a:off x="740569" y="1210686"/>
+            <a:ext cx="5265120" cy="5083752"/>
+          </a:xfrm>
+          <a:prstGeom prst="rect">
+            <a:avLst/>
+          </a:prstGeom>
+        </p:spPr>
+      </p:pic>
+      <p:pic>
+        <p:nvPicPr>
+          <p:cNvPr id="20" name="Picture 19" descr="Chart, scatter chart&#10;&#10;Description automatically generated">
+            <a:extLst>
+              <a:ext uri="{FF2B5EF4-FFF2-40B4-BE49-F238E27FC236}">
+                <a16:creationId xmlns:a16="http://schemas.microsoft.com/office/drawing/2014/main" id="{65265210-F59F-0F4A-B1EA-6EEBB9B1E50C}"/>
+              </a:ext>
+            </a:extLst>
+          </p:cNvPr>
+          <p:cNvPicPr>
+            <a:picLocks noChangeAspect="1"/>
+          </p:cNvPicPr>
+          <p:nvPr/>
+        </p:nvPicPr>
+        <p:blipFill>
+          <a:blip r:embed="rId3"/>
+          <a:stretch>
+            <a:fillRect/>
+          </a:stretch>
+        </p:blipFill>
+        <p:spPr>
+          <a:xfrm>
+            <a:off x="6089650" y="1210687"/>
+            <a:ext cx="5348550" cy="5083752"/>
+          </a:xfrm>
+          <a:prstGeom prst="rect">
+            <a:avLst/>
+          </a:prstGeom>
+        </p:spPr>
+      </p:pic>
+      <p:sp>
+        <p:nvSpPr>
+          <p:cNvPr id="2" name="Title 1">
+            <a:extLst>
+              <a:ext uri="{FF2B5EF4-FFF2-40B4-BE49-F238E27FC236}">
+                <a16:creationId xmlns:a16="http://schemas.microsoft.com/office/drawing/2014/main" id="{8EB5AD18-AB89-C540-8EBB-B97CF8E5B0B2}"/>
+              </a:ext>
+            </a:extLst>
+          </p:cNvPr>
+          <p:cNvSpPr>
+            <a:spLocks noGrp="1"/>
+          </p:cNvSpPr>
+          <p:nvPr>
+            <p:ph type="title"/>
+          </p:nvPr>
+        </p:nvSpPr>
+        <p:spPr>
+          <a:xfrm>
+            <a:off x="838200" y="184805"/>
+            <a:ext cx="10515600" cy="1505883"/>
+          </a:xfrm>
+        </p:spPr>
+        <p:txBody>
+          <a:bodyPr vert="horz" lIns="91440" tIns="45720" rIns="91440" bIns="45720" rtlCol="0" anchor="ctr">
+            <a:normAutofit/>
+          </a:bodyPr>
+          <a:lstStyle/>
+          <a:p>
+            <a:r>
+              <a:rPr lang="en-US" sz="5200" kern="1200" dirty="0">
+                <a:solidFill>
+                  <a:schemeClr val="tx1"/>
+                </a:solidFill>
+                <a:latin typeface="CMU Serif Roman" panose="02000603000000000000" pitchFamily="2" charset="0"/>
+                <a:ea typeface="CMU Serif Roman" panose="02000603000000000000" pitchFamily="2" charset="0"/>
+                <a:cs typeface="CMU Serif Roman" panose="02000603000000000000" pitchFamily="2" charset="0"/>
+              </a:rPr>
+              <a:t>Results on Total Prediction (RF) </a:t>
+            </a:r>
+          </a:p>
+        </p:txBody>
+      </p:sp>
+    </p:spTree>
+    <p:extLst>
+      <p:ext uri="{BB962C8B-B14F-4D97-AF65-F5344CB8AC3E}">
+        <p14:creationId xmlns:p14="http://schemas.microsoft.com/office/powerpoint/2010/main" val="3022565730"/>
+      </p:ext>
+    </p:extLst>
+  </p:cSld>
+  <p:clrMapOvr>
+    <a:masterClrMapping/>
+  </p:clrMapOvr>
+</p:sld>
+</file>
+
+<file path=ppt/slides/slide8.xml><?xml version="1.0" encoding="utf-8"?>
 <p:sld xmlns:a="http://schemas.openxmlformats.org/drawingml/2006/main" xmlns:r="http://schemas.openxmlformats.org/officeDocument/2006/relationships" xmlns:p="http://schemas.openxmlformats.org/presentationml/2006/main">
   <p:cSld>
     <p:bg>
@@ -10040,7 +10771,7 @@
         </p:nvSpPr>
         <p:spPr>
           <a:xfrm>
-            <a:off x="863128" y="2376210"/>
+            <a:off x="631901" y="2071410"/>
             <a:ext cx="4959603" cy="3522569"/>
           </a:xfrm>
           <a:prstGeom prst="rect">
@@ -10165,7 +10896,7 @@
                 <a:ea typeface="CMU Serif Roman" panose="02000603000000000000" pitchFamily="2" charset="0"/>
                 <a:cs typeface="CMU Serif Roman" panose="02000603000000000000" pitchFamily="2" charset="0"/>
               </a:rPr>
-              <a:t> 0.001, batch size 128, epochs 250, dropout 0.2</a:t>
+              <a:t> 0.001, batch size 50, epochs 250, dropout 0.2</a:t>
             </a:r>
           </a:p>
           <a:p>
@@ -10221,7 +10952,7 @@
                 <a:ea typeface="CMU Serif Roman" panose="02000603000000000000" pitchFamily="2" charset="0"/>
                 <a:cs typeface="CMU Serif Roman" panose="02000603000000000000" pitchFamily="2" charset="0"/>
               </a:rPr>
-              <a:t> 0.001, batch size 50, epochs 100, dropout 0.2</a:t>
+              <a:t> 0.001, batch size 50, epochs 400, dropout 0.2</a:t>
             </a:r>
           </a:p>
           <a:p>
@@ -10242,15 +10973,13 @@
             </a:endParaRPr>
           </a:p>
           <a:p>
-            <a:pPr marL="285750" indent="-228600">
+            <a:pPr marL="57150">
               <a:lnSpc>
                 <a:spcPct val="90000"/>
               </a:lnSpc>
               <a:spcAft>
                 <a:spcPts val="600"/>
               </a:spcAft>
-              <a:buFont typeface="Arial" panose="020B0604020202020204" pitchFamily="34" charset="0"/>
-              <a:buChar char="•"/>
             </a:pPr>
             <a:endParaRPr lang="en-US" sz="2000" dirty="0">
               <a:latin typeface="CMU Serif Roman" panose="02000603000000000000" pitchFamily="2" charset="0"/>
@@ -10424,13 +11153,13 @@
                 <p:ph idx="1"/>
                 <p:extLst>
                   <p:ext uri="{D42A27DB-BD31-4B8C-83A1-F6EECF244321}">
-                    <p14:modId xmlns:p14="http://schemas.microsoft.com/office/powerpoint/2010/main" val="1017330189"/>
+                    <p14:modId xmlns:p14="http://schemas.microsoft.com/office/powerpoint/2010/main" val="2887402970"/>
                   </p:ext>
                 </p:extLst>
               </p:nvPr>
             </p:nvGraphicFramePr>
             <p:xfrm>
-              <a:off x="5822731" y="1099382"/>
+              <a:off x="5591504" y="1264021"/>
               <a:ext cx="5815725" cy="4202036"/>
             </p:xfrm>
             <a:graphic>
@@ -10626,7 +11355,7 @@
                               <a:ea typeface="CMU Serif Roman" panose="02000603000000000000" pitchFamily="2" charset="0"/>
                               <a:cs typeface="CMU Serif Roman" panose="02000603000000000000" pitchFamily="2" charset="0"/>
                             </a:rPr>
-                            <a:t>0.896</a:t>
+                            <a:t>0.901</a:t>
                           </a:r>
                         </a:p>
                       </a:txBody>
@@ -10701,7 +11430,7 @@
                               <a:ea typeface="CMU Serif Roman" panose="02000603000000000000" pitchFamily="2" charset="0"/>
                               <a:cs typeface="CMU Serif Roman" panose="02000603000000000000" pitchFamily="2" charset="0"/>
                             </a:rPr>
-                            <a:t>0.768</a:t>
+                            <a:t>0.790</a:t>
                           </a:r>
                         </a:p>
                       </a:txBody>
@@ -10742,7 +11471,7 @@
                               <a:ea typeface="CMU Serif Roman" panose="02000603000000000000" pitchFamily="2" charset="0"/>
                               <a:cs typeface="CMU Serif Roman" panose="02000603000000000000" pitchFamily="2" charset="0"/>
                             </a:rPr>
-                            <a:t>0.932</a:t>
+                            <a:t>0.936</a:t>
                           </a:r>
                         </a:p>
                       </a:txBody>
@@ -10759,7 +11488,7 @@
                               <a:ea typeface="CMU Serif Roman" panose="02000603000000000000" pitchFamily="2" charset="0"/>
                               <a:cs typeface="CMU Serif Roman" panose="02000603000000000000" pitchFamily="2" charset="0"/>
                             </a:rPr>
-                            <a:t>0.758</a:t>
+                            <a:t>0.756</a:t>
                           </a:r>
                         </a:p>
                       </a:txBody>
@@ -10800,7 +11529,7 @@
                               <a:ea typeface="CMU Serif Roman" panose="02000603000000000000" pitchFamily="2" charset="0"/>
                               <a:cs typeface="CMU Serif Roman" panose="02000603000000000000" pitchFamily="2" charset="0"/>
                             </a:rPr>
-                            <a:t>0.737</a:t>
+                            <a:t>0.825</a:t>
                           </a:r>
                         </a:p>
                       </a:txBody>
@@ -10817,7 +11546,7 @@
                               <a:ea typeface="CMU Serif Roman" panose="02000603000000000000" pitchFamily="2" charset="0"/>
                               <a:cs typeface="CMU Serif Roman" panose="02000603000000000000" pitchFamily="2" charset="0"/>
                             </a:rPr>
-                            <a:t>0.532</a:t>
+                            <a:t>0.533</a:t>
                           </a:r>
                         </a:p>
                       </a:txBody>
@@ -10858,7 +11587,7 @@
                               <a:ea typeface="CMU Serif Roman" panose="02000603000000000000" pitchFamily="2" charset="0"/>
                               <a:cs typeface="CMU Serif Roman" panose="02000603000000000000" pitchFamily="2" charset="0"/>
                             </a:rPr>
-                            <a:t>0.893</a:t>
+                            <a:t>0.919</a:t>
                           </a:r>
                         </a:p>
                       </a:txBody>
@@ -10875,7 +11604,7 @@
                               <a:ea typeface="CMU Serif Roman" panose="02000603000000000000" pitchFamily="2" charset="0"/>
                               <a:cs typeface="CMU Serif Roman" panose="02000603000000000000" pitchFamily="2" charset="0"/>
                             </a:rPr>
-                            <a:t>0.776</a:t>
+                            <a:t>0.712</a:t>
                           </a:r>
                         </a:p>
                       </a:txBody>
@@ -10909,13 +11638,13 @@
                 <p:ph idx="1"/>
                 <p:extLst>
                   <p:ext uri="{D42A27DB-BD31-4B8C-83A1-F6EECF244321}">
-                    <p14:modId xmlns:p14="http://schemas.microsoft.com/office/powerpoint/2010/main" val="1017330189"/>
+                    <p14:modId xmlns:p14="http://schemas.microsoft.com/office/powerpoint/2010/main" val="2887402970"/>
                   </p:ext>
                 </p:extLst>
               </p:nvPr>
             </p:nvGraphicFramePr>
             <p:xfrm>
-              <a:off x="5822731" y="1099382"/>
+              <a:off x="5591504" y="1264021"/>
               <a:ext cx="5815725" cy="4202036"/>
             </p:xfrm>
             <a:graphic>
@@ -10974,7 +11703,7 @@
                         <a:blipFill>
                           <a:blip r:embed="rId2"/>
                           <a:stretch>
-                            <a:fillRect l="-89506" t="-3226" r="-95679" b="-456452"/>
+                            <a:fillRect l="-89506" t="-4839" r="-95679" b="-456452"/>
                           </a:stretch>
                         </a:blipFill>
                       </a:tcPr>
@@ -10991,7 +11720,7 @@
                         <a:blipFill>
                           <a:blip r:embed="rId2"/>
                           <a:stretch>
-                            <a:fillRect l="-200654" t="-3226" r="-1307" b="-456452"/>
+                            <a:fillRect l="-200654" t="-4839" r="-1307" b="-456452"/>
                           </a:stretch>
                         </a:blipFill>
                       </a:tcPr>
@@ -11031,7 +11760,7 @@
                               <a:ea typeface="CMU Serif Roman" panose="02000603000000000000" pitchFamily="2" charset="0"/>
                               <a:cs typeface="CMU Serif Roman" panose="02000603000000000000" pitchFamily="2" charset="0"/>
                             </a:rPr>
-                            <a:t>0.896</a:t>
+                            <a:t>0.901</a:t>
                           </a:r>
                         </a:p>
                       </a:txBody>
@@ -11106,7 +11835,7 @@
                               <a:ea typeface="CMU Serif Roman" panose="02000603000000000000" pitchFamily="2" charset="0"/>
                               <a:cs typeface="CMU Serif Roman" panose="02000603000000000000" pitchFamily="2" charset="0"/>
                             </a:rPr>
-                            <a:t>0.768</a:t>
+                            <a:t>0.790</a:t>
                           </a:r>
                         </a:p>
                       </a:txBody>
@@ -11147,7 +11876,7 @@
                               <a:ea typeface="CMU Serif Roman" panose="02000603000000000000" pitchFamily="2" charset="0"/>
                               <a:cs typeface="CMU Serif Roman" panose="02000603000000000000" pitchFamily="2" charset="0"/>
                             </a:rPr>
-                            <a:t>0.932</a:t>
+                            <a:t>0.936</a:t>
                           </a:r>
                         </a:p>
                       </a:txBody>
@@ -11164,7 +11893,7 @@
                               <a:ea typeface="CMU Serif Roman" panose="02000603000000000000" pitchFamily="2" charset="0"/>
                               <a:cs typeface="CMU Serif Roman" panose="02000603000000000000" pitchFamily="2" charset="0"/>
                             </a:rPr>
-                            <a:t>0.758</a:t>
+                            <a:t>0.756</a:t>
                           </a:r>
                         </a:p>
                       </a:txBody>
@@ -11205,7 +11934,7 @@
                               <a:ea typeface="CMU Serif Roman" panose="02000603000000000000" pitchFamily="2" charset="0"/>
                               <a:cs typeface="CMU Serif Roman" panose="02000603000000000000" pitchFamily="2" charset="0"/>
                             </a:rPr>
-                            <a:t>0.737</a:t>
+                            <a:t>0.825</a:t>
                           </a:r>
                         </a:p>
                       </a:txBody>
@@ -11222,7 +11951,7 @@
                               <a:ea typeface="CMU Serif Roman" panose="02000603000000000000" pitchFamily="2" charset="0"/>
                               <a:cs typeface="CMU Serif Roman" panose="02000603000000000000" pitchFamily="2" charset="0"/>
                             </a:rPr>
-                            <a:t>0.532</a:t>
+                            <a:t>0.533</a:t>
                           </a:r>
                         </a:p>
                       </a:txBody>
@@ -11263,7 +11992,7 @@
                               <a:ea typeface="CMU Serif Roman" panose="02000603000000000000" pitchFamily="2" charset="0"/>
                               <a:cs typeface="CMU Serif Roman" panose="02000603000000000000" pitchFamily="2" charset="0"/>
                             </a:rPr>
-                            <a:t>0.893</a:t>
+                            <a:t>0.919</a:t>
                           </a:r>
                         </a:p>
                       </a:txBody>
@@ -11280,7 +12009,7 @@
                               <a:ea typeface="CMU Serif Roman" panose="02000603000000000000" pitchFamily="2" charset="0"/>
                               <a:cs typeface="CMU Serif Roman" panose="02000603000000000000" pitchFamily="2" charset="0"/>
                             </a:rPr>
-                            <a:t>0.776</a:t>
+                            <a:t>0.712</a:t>
                           </a:r>
                         </a:p>
                       </a:txBody>
@@ -11311,7 +12040,7 @@
 </p:sld>
 </file>
 
-<file path=ppt/slides/slide8.xml><?xml version="1.0" encoding="utf-8"?>
+<file path=ppt/slides/slide9.xml><?xml version="1.0" encoding="utf-8"?>
 <p:sld xmlns:a="http://schemas.openxmlformats.org/drawingml/2006/main" xmlns:r="http://schemas.openxmlformats.org/officeDocument/2006/relationships" xmlns:p="http://schemas.openxmlformats.org/presentationml/2006/main">
   <p:cSld>
     <p:bg>
@@ -11338,7 +12067,7 @@
       </p:grpSpPr>
       <p:sp useBgFill="1">
         <p:nvSpPr>
-          <p:cNvPr id="21" name="Rectangle 20">
+          <p:cNvPr id="26" name="Rectangle 25">
             <a:extLst>
               <a:ext uri="{FF2B5EF4-FFF2-40B4-BE49-F238E27FC236}">
                 <a16:creationId xmlns:a16="http://schemas.microsoft.com/office/drawing/2014/main" id="{53F29798-D584-4792-9B62-3F5F5C36D619}"/>
@@ -11398,206 +12127,6 @@
       </p:sp>
       <p:pic>
         <p:nvPicPr>
-          <p:cNvPr id="8" name="Picture 7" descr="Chart, scatter chart&#10;&#10;Description automatically generated">
-            <a:extLst>
-              <a:ext uri="{FF2B5EF4-FFF2-40B4-BE49-F238E27FC236}">
-                <a16:creationId xmlns:a16="http://schemas.microsoft.com/office/drawing/2014/main" id="{846DA017-B2FF-9345-ACA7-319863712291}"/>
-              </a:ext>
-            </a:extLst>
-          </p:cNvPr>
-          <p:cNvPicPr>
-            <a:picLocks noChangeAspect="1"/>
-          </p:cNvPicPr>
-          <p:nvPr/>
-        </p:nvPicPr>
-        <p:blipFill>
-          <a:blip r:embed="rId2"/>
-          <a:stretch>
-            <a:fillRect/>
-          </a:stretch>
-        </p:blipFill>
-        <p:spPr>
-          <a:xfrm>
-            <a:off x="900457" y="1258962"/>
-            <a:ext cx="4933133" cy="4889524"/>
-          </a:xfrm>
-          <a:prstGeom prst="rect">
-            <a:avLst/>
-          </a:prstGeom>
-        </p:spPr>
-      </p:pic>
-      <p:pic>
-        <p:nvPicPr>
-          <p:cNvPr id="10" name="Picture 9" descr="Chart, scatter chart&#10;&#10;Description automatically generated">
-            <a:extLst>
-              <a:ext uri="{FF2B5EF4-FFF2-40B4-BE49-F238E27FC236}">
-                <a16:creationId xmlns:a16="http://schemas.microsoft.com/office/drawing/2014/main" id="{908C4F3F-1FFD-B64C-9511-CAFBB0B30541}"/>
-              </a:ext>
-            </a:extLst>
-          </p:cNvPr>
-          <p:cNvPicPr>
-            <a:picLocks noChangeAspect="1"/>
-          </p:cNvPicPr>
-          <p:nvPr/>
-        </p:nvPicPr>
-        <p:blipFill>
-          <a:blip r:embed="rId3"/>
-          <a:stretch>
-            <a:fillRect/>
-          </a:stretch>
-        </p:blipFill>
-        <p:spPr>
-          <a:xfrm>
-            <a:off x="6252690" y="1258962"/>
-            <a:ext cx="5227637" cy="5181425"/>
-          </a:xfrm>
-          <a:prstGeom prst="rect">
-            <a:avLst/>
-          </a:prstGeom>
-        </p:spPr>
-      </p:pic>
-      <p:sp>
-        <p:nvSpPr>
-          <p:cNvPr id="2" name="Title 1">
-            <a:extLst>
-              <a:ext uri="{FF2B5EF4-FFF2-40B4-BE49-F238E27FC236}">
-                <a16:creationId xmlns:a16="http://schemas.microsoft.com/office/drawing/2014/main" id="{8EB5AD18-AB89-C540-8EBB-B97CF8E5B0B2}"/>
-              </a:ext>
-            </a:extLst>
-          </p:cNvPr>
-          <p:cNvSpPr>
-            <a:spLocks noGrp="1"/>
-          </p:cNvSpPr>
-          <p:nvPr>
-            <p:ph type="title"/>
-          </p:nvPr>
-        </p:nvSpPr>
-        <p:spPr>
-          <a:xfrm>
-            <a:off x="838200" y="184805"/>
-            <a:ext cx="10515600" cy="1505883"/>
-          </a:xfrm>
-        </p:spPr>
-        <p:txBody>
-          <a:bodyPr vert="horz" lIns="91440" tIns="45720" rIns="91440" bIns="45720" rtlCol="0" anchor="ctr">
-            <a:normAutofit/>
-          </a:bodyPr>
-          <a:lstStyle/>
-          <a:p>
-            <a:r>
-              <a:rPr lang="en-US" sz="5200" kern="1200" dirty="0">
-                <a:solidFill>
-                  <a:schemeClr val="tx1"/>
-                </a:solidFill>
-                <a:latin typeface="CMU Serif Roman" panose="02000603000000000000" pitchFamily="2" charset="0"/>
-                <a:ea typeface="CMU Serif Roman" panose="02000603000000000000" pitchFamily="2" charset="0"/>
-                <a:cs typeface="CMU Serif Roman" panose="02000603000000000000" pitchFamily="2" charset="0"/>
-              </a:rPr>
-              <a:t>Results continued (RF) </a:t>
-            </a:r>
-          </a:p>
-        </p:txBody>
-      </p:sp>
-    </p:spTree>
-    <p:extLst>
-      <p:ext uri="{BB962C8B-B14F-4D97-AF65-F5344CB8AC3E}">
-        <p14:creationId xmlns:p14="http://schemas.microsoft.com/office/powerpoint/2010/main" val="3022565730"/>
-      </p:ext>
-    </p:extLst>
-  </p:cSld>
-  <p:clrMapOvr>
-    <a:masterClrMapping/>
-  </p:clrMapOvr>
-</p:sld>
-</file>
-
-<file path=ppt/slides/slide9.xml><?xml version="1.0" encoding="utf-8"?>
-<p:sld xmlns:a="http://schemas.openxmlformats.org/drawingml/2006/main" xmlns:r="http://schemas.openxmlformats.org/officeDocument/2006/relationships" xmlns:p="http://schemas.openxmlformats.org/presentationml/2006/main">
-  <p:cSld>
-    <p:bg>
-      <p:bgPr>
-        <a:solidFill>
-          <a:schemeClr val="bg1"/>
-        </a:solidFill>
-        <a:effectLst/>
-      </p:bgPr>
-    </p:bg>
-    <p:spTree>
-      <p:nvGrpSpPr>
-        <p:cNvPr id="1" name=""/>
-        <p:cNvGrpSpPr/>
-        <p:nvPr/>
-      </p:nvGrpSpPr>
-      <p:grpSpPr>
-        <a:xfrm>
-          <a:off x="0" y="0"/>
-          <a:ext cx="0" cy="0"/>
-          <a:chOff x="0" y="0"/>
-          <a:chExt cx="0" cy="0"/>
-        </a:xfrm>
-      </p:grpSpPr>
-      <p:sp useBgFill="1">
-        <p:nvSpPr>
-          <p:cNvPr id="26" name="Rectangle 25">
-            <a:extLst>
-              <a:ext uri="{FF2B5EF4-FFF2-40B4-BE49-F238E27FC236}">
-                <a16:creationId xmlns:a16="http://schemas.microsoft.com/office/drawing/2014/main" id="{53F29798-D584-4792-9B62-3F5F5C36D619}"/>
-              </a:ext>
-              <a:ext uri="{C183D7F6-B498-43B3-948B-1728B52AA6E4}">
-                <adec:decorative xmlns:adec="http://schemas.microsoft.com/office/drawing/2017/decorative" val="1"/>
-              </a:ext>
-            </a:extLst>
-          </p:cNvPr>
-          <p:cNvSpPr>
-            <a:spLocks noGrp="1" noRot="1" noChangeAspect="1" noMove="1" noResize="1" noEditPoints="1" noAdjustHandles="1" noChangeArrowheads="1" noChangeShapeType="1" noTextEdit="1"/>
-          </p:cNvSpPr>
-          <p:nvPr>
-            <p:extLst>
-              <p:ext uri="{386F3935-93C4-4BCD-93E2-E3B085C9AB24}">
-                <p16:designElem xmlns:p16="http://schemas.microsoft.com/office/powerpoint/2015/main" val="1"/>
-              </p:ext>
-            </p:extLst>
-          </p:nvPr>
-        </p:nvSpPr>
-        <p:spPr>
-          <a:xfrm>
-            <a:off x="0" y="0"/>
-            <a:ext cx="12188952" cy="6858000"/>
-          </a:xfrm>
-          <a:prstGeom prst="rect">
-            <a:avLst/>
-          </a:prstGeom>
-          <a:ln>
-            <a:noFill/>
-          </a:ln>
-        </p:spPr>
-        <p:style>
-          <a:lnRef idx="2">
-            <a:schemeClr val="accent1">
-              <a:shade val="50000"/>
-            </a:schemeClr>
-          </a:lnRef>
-          <a:fillRef idx="1">
-            <a:schemeClr val="accent1"/>
-          </a:fillRef>
-          <a:effectRef idx="0">
-            <a:schemeClr val="accent1"/>
-          </a:effectRef>
-          <a:fontRef idx="minor">
-            <a:schemeClr val="lt1"/>
-          </a:fontRef>
-        </p:style>
-        <p:txBody>
-          <a:bodyPr rtlCol="0" anchor="ctr"/>
-          <a:lstStyle/>
-          <a:p>
-            <a:pPr algn="ctr"/>
-            <a:endParaRPr lang="en-US"/>
-          </a:p>
-        </p:txBody>
-      </p:sp>
-      <p:pic>
-        <p:nvPicPr>
           <p:cNvPr id="4" name="Picture 3" descr="Chart, scatter chart&#10;&#10;Description automatically generated">
             <a:extLst>
               <a:ext uri="{FF2B5EF4-FFF2-40B4-BE49-F238E27FC236}">
@@ -11693,7 +12222,7 @@
                 <a:ea typeface="CMU Serif Roman" panose="02000603000000000000" pitchFamily="2" charset="0"/>
                 <a:cs typeface="CMU Serif Roman" panose="02000603000000000000" pitchFamily="2" charset="0"/>
               </a:rPr>
-              <a:t>Results continued (RF) </a:t>
+              <a:t>Results on Average (RF) </a:t>
             </a:r>
           </a:p>
         </p:txBody>
@@ -12244,4 +12773,299 @@
     </a:ext>
   </a:extLst>
 </a:theme>
+</file>
+
+<file path=ppt/theme/theme2.xml><?xml version="1.0" encoding="utf-8"?>
+<a:theme xmlns:a="http://schemas.openxmlformats.org/drawingml/2006/main" name="Office Theme">
+  <a:themeElements>
+    <a:clrScheme name="Office">
+      <a:dk1>
+        <a:sysClr val="windowText" lastClr="000000"/>
+      </a:dk1>
+      <a:lt1>
+        <a:sysClr val="window" lastClr="FFFFFF"/>
+      </a:lt1>
+      <a:dk2>
+        <a:srgbClr val="44546A"/>
+      </a:dk2>
+      <a:lt2>
+        <a:srgbClr val="E7E6E6"/>
+      </a:lt2>
+      <a:accent1>
+        <a:srgbClr val="4472C4"/>
+      </a:accent1>
+      <a:accent2>
+        <a:srgbClr val="ED7D31"/>
+      </a:accent2>
+      <a:accent3>
+        <a:srgbClr val="A5A5A5"/>
+      </a:accent3>
+      <a:accent4>
+        <a:srgbClr val="FFC000"/>
+      </a:accent4>
+      <a:accent5>
+        <a:srgbClr val="5B9BD5"/>
+      </a:accent5>
+      <a:accent6>
+        <a:srgbClr val="70AD47"/>
+      </a:accent6>
+      <a:hlink>
+        <a:srgbClr val="0563C1"/>
+      </a:hlink>
+      <a:folHlink>
+        <a:srgbClr val="954F72"/>
+      </a:folHlink>
+    </a:clrScheme>
+    <a:fontScheme name="Office">
+      <a:majorFont>
+        <a:latin typeface="Calibri Light" panose="020F0302020204030204"/>
+        <a:ea typeface=""/>
+        <a:cs typeface=""/>
+        <a:font script="Jpan" typeface="游ゴシック Light"/>
+        <a:font script="Hang" typeface="맑은 고딕"/>
+        <a:font script="Hans" typeface="等线 Light"/>
+        <a:font script="Hant" typeface="新細明體"/>
+        <a:font script="Arab" typeface="Times New Roman"/>
+        <a:font script="Hebr" typeface="Times New Roman"/>
+        <a:font script="Thai" typeface="Angsana New"/>
+        <a:font script="Ethi" typeface="Nyala"/>
+        <a:font script="Beng" typeface="Vrinda"/>
+        <a:font script="Gujr" typeface="Shruti"/>
+        <a:font script="Khmr" typeface="MoolBoran"/>
+        <a:font script="Knda" typeface="Tunga"/>
+        <a:font script="Guru" typeface="Raavi"/>
+        <a:font script="Cans" typeface="Euphemia"/>
+        <a:font script="Cher" typeface="Plantagenet Cherokee"/>
+        <a:font script="Yiii" typeface="Microsoft Yi Baiti"/>
+        <a:font script="Tibt" typeface="Microsoft Himalaya"/>
+        <a:font script="Thaa" typeface="MV Boli"/>
+        <a:font script="Deva" typeface="Mangal"/>
+        <a:font script="Telu" typeface="Gautami"/>
+        <a:font script="Taml" typeface="Latha"/>
+        <a:font script="Syrc" typeface="Estrangelo Edessa"/>
+        <a:font script="Orya" typeface="Kalinga"/>
+        <a:font script="Mlym" typeface="Kartika"/>
+        <a:font script="Laoo" typeface="DokChampa"/>
+        <a:font script="Sinh" typeface="Iskoola Pota"/>
+        <a:font script="Mong" typeface="Mongolian Baiti"/>
+        <a:font script="Viet" typeface="Times New Roman"/>
+        <a:font script="Uigh" typeface="Microsoft Uighur"/>
+        <a:font script="Geor" typeface="Sylfaen"/>
+        <a:font script="Armn" typeface="Arial"/>
+        <a:font script="Bugi" typeface="Leelawadee UI"/>
+        <a:font script="Bopo" typeface="Microsoft JhengHei"/>
+        <a:font script="Java" typeface="Javanese Text"/>
+        <a:font script="Lisu" typeface="Segoe UI"/>
+        <a:font script="Mymr" typeface="Myanmar Text"/>
+        <a:font script="Nkoo" typeface="Ebrima"/>
+        <a:font script="Olck" typeface="Nirmala UI"/>
+        <a:font script="Osma" typeface="Ebrima"/>
+        <a:font script="Phag" typeface="Phagspa"/>
+        <a:font script="Syrn" typeface="Estrangelo Edessa"/>
+        <a:font script="Syrj" typeface="Estrangelo Edessa"/>
+        <a:font script="Syre" typeface="Estrangelo Edessa"/>
+        <a:font script="Sora" typeface="Nirmala UI"/>
+        <a:font script="Tale" typeface="Microsoft Tai Le"/>
+        <a:font script="Talu" typeface="Microsoft New Tai Lue"/>
+        <a:font script="Tfng" typeface="Ebrima"/>
+      </a:majorFont>
+      <a:minorFont>
+        <a:latin typeface="Calibri" panose="020F0502020204030204"/>
+        <a:ea typeface=""/>
+        <a:cs typeface=""/>
+        <a:font script="Jpan" typeface="游ゴシック"/>
+        <a:font script="Hang" typeface="맑은 고딕"/>
+        <a:font script="Hans" typeface="等线"/>
+        <a:font script="Hant" typeface="新細明體"/>
+        <a:font script="Arab" typeface="Arial"/>
+        <a:font script="Hebr" typeface="Arial"/>
+        <a:font script="Thai" typeface="Cordia New"/>
+        <a:font script="Ethi" typeface="Nyala"/>
+        <a:font script="Beng" typeface="Vrinda"/>
+        <a:font script="Gujr" typeface="Shruti"/>
+        <a:font script="Khmr" typeface="DaunPenh"/>
+        <a:font script="Knda" typeface="Tunga"/>
+        <a:font script="Guru" typeface="Raavi"/>
+        <a:font script="Cans" typeface="Euphemia"/>
+        <a:font script="Cher" typeface="Plantagenet Cherokee"/>
+        <a:font script="Yiii" typeface="Microsoft Yi Baiti"/>
+        <a:font script="Tibt" typeface="Microsoft Himalaya"/>
+        <a:font script="Thaa" typeface="MV Boli"/>
+        <a:font script="Deva" typeface="Mangal"/>
+        <a:font script="Telu" typeface="Gautami"/>
+        <a:font script="Taml" typeface="Latha"/>
+        <a:font script="Syrc" typeface="Estrangelo Edessa"/>
+        <a:font script="Orya" typeface="Kalinga"/>
+        <a:font script="Mlym" typeface="Kartika"/>
+        <a:font script="Laoo" typeface="DokChampa"/>
+        <a:font script="Sinh" typeface="Iskoola Pota"/>
+        <a:font script="Mong" typeface="Mongolian Baiti"/>
+        <a:font script="Viet" typeface="Arial"/>
+        <a:font script="Uigh" typeface="Microsoft Uighur"/>
+        <a:font script="Geor" typeface="Sylfaen"/>
+        <a:font script="Armn" typeface="Arial"/>
+        <a:font script="Bugi" typeface="Leelawadee UI"/>
+        <a:font script="Bopo" typeface="Microsoft JhengHei"/>
+        <a:font script="Java" typeface="Javanese Text"/>
+        <a:font script="Lisu" typeface="Segoe UI"/>
+        <a:font script="Mymr" typeface="Myanmar Text"/>
+        <a:font script="Nkoo" typeface="Ebrima"/>
+        <a:font script="Olck" typeface="Nirmala UI"/>
+        <a:font script="Osma" typeface="Ebrima"/>
+        <a:font script="Phag" typeface="Phagspa"/>
+        <a:font script="Syrn" typeface="Estrangelo Edessa"/>
+        <a:font script="Syrj" typeface="Estrangelo Edessa"/>
+        <a:font script="Syre" typeface="Estrangelo Edessa"/>
+        <a:font script="Sora" typeface="Nirmala UI"/>
+        <a:font script="Tale" typeface="Microsoft Tai Le"/>
+        <a:font script="Talu" typeface="Microsoft New Tai Lue"/>
+        <a:font script="Tfng" typeface="Ebrima"/>
+      </a:minorFont>
+    </a:fontScheme>
+    <a:fmtScheme name="Office">
+      <a:fillStyleLst>
+        <a:solidFill>
+          <a:schemeClr val="phClr"/>
+        </a:solidFill>
+        <a:gradFill rotWithShape="1">
+          <a:gsLst>
+            <a:gs pos="0">
+              <a:schemeClr val="phClr">
+                <a:lumMod val="110000"/>
+                <a:satMod val="105000"/>
+                <a:tint val="67000"/>
+              </a:schemeClr>
+            </a:gs>
+            <a:gs pos="50000">
+              <a:schemeClr val="phClr">
+                <a:lumMod val="105000"/>
+                <a:satMod val="103000"/>
+                <a:tint val="73000"/>
+              </a:schemeClr>
+            </a:gs>
+            <a:gs pos="100000">
+              <a:schemeClr val="phClr">
+                <a:lumMod val="105000"/>
+                <a:satMod val="109000"/>
+                <a:tint val="81000"/>
+              </a:schemeClr>
+            </a:gs>
+          </a:gsLst>
+          <a:lin ang="5400000" scaled="0"/>
+        </a:gradFill>
+        <a:gradFill rotWithShape="1">
+          <a:gsLst>
+            <a:gs pos="0">
+              <a:schemeClr val="phClr">
+                <a:satMod val="103000"/>
+                <a:lumMod val="102000"/>
+                <a:tint val="94000"/>
+              </a:schemeClr>
+            </a:gs>
+            <a:gs pos="50000">
+              <a:schemeClr val="phClr">
+                <a:satMod val="110000"/>
+                <a:lumMod val="100000"/>
+                <a:shade val="100000"/>
+              </a:schemeClr>
+            </a:gs>
+            <a:gs pos="100000">
+              <a:schemeClr val="phClr">
+                <a:lumMod val="99000"/>
+                <a:satMod val="120000"/>
+                <a:shade val="78000"/>
+              </a:schemeClr>
+            </a:gs>
+          </a:gsLst>
+          <a:lin ang="5400000" scaled="0"/>
+        </a:gradFill>
+      </a:fillStyleLst>
+      <a:lnStyleLst>
+        <a:ln w="6350" cap="flat" cmpd="sng" algn="ctr">
+          <a:solidFill>
+            <a:schemeClr val="phClr"/>
+          </a:solidFill>
+          <a:prstDash val="solid"/>
+          <a:miter lim="800000"/>
+        </a:ln>
+        <a:ln w="12700" cap="flat" cmpd="sng" algn="ctr">
+          <a:solidFill>
+            <a:schemeClr val="phClr"/>
+          </a:solidFill>
+          <a:prstDash val="solid"/>
+          <a:miter lim="800000"/>
+        </a:ln>
+        <a:ln w="19050" cap="flat" cmpd="sng" algn="ctr">
+          <a:solidFill>
+            <a:schemeClr val="phClr"/>
+          </a:solidFill>
+          <a:prstDash val="solid"/>
+          <a:miter lim="800000"/>
+        </a:ln>
+      </a:lnStyleLst>
+      <a:effectStyleLst>
+        <a:effectStyle>
+          <a:effectLst/>
+        </a:effectStyle>
+        <a:effectStyle>
+          <a:effectLst/>
+        </a:effectStyle>
+        <a:effectStyle>
+          <a:effectLst>
+            <a:outerShdw blurRad="57150" dist="19050" dir="5400000" algn="ctr" rotWithShape="0">
+              <a:srgbClr val="000000">
+                <a:alpha val="63000"/>
+              </a:srgbClr>
+            </a:outerShdw>
+          </a:effectLst>
+        </a:effectStyle>
+      </a:effectStyleLst>
+      <a:bgFillStyleLst>
+        <a:solidFill>
+          <a:schemeClr val="phClr"/>
+        </a:solidFill>
+        <a:solidFill>
+          <a:schemeClr val="phClr">
+            <a:tint val="95000"/>
+            <a:satMod val="170000"/>
+          </a:schemeClr>
+        </a:solidFill>
+        <a:gradFill rotWithShape="1">
+          <a:gsLst>
+            <a:gs pos="0">
+              <a:schemeClr val="phClr">
+                <a:tint val="93000"/>
+                <a:satMod val="150000"/>
+                <a:shade val="98000"/>
+                <a:lumMod val="102000"/>
+              </a:schemeClr>
+            </a:gs>
+            <a:gs pos="50000">
+              <a:schemeClr val="phClr">
+                <a:tint val="98000"/>
+                <a:satMod val="130000"/>
+                <a:shade val="90000"/>
+                <a:lumMod val="103000"/>
+              </a:schemeClr>
+            </a:gs>
+            <a:gs pos="100000">
+              <a:schemeClr val="phClr">
+                <a:shade val="63000"/>
+                <a:satMod val="120000"/>
+              </a:schemeClr>
+            </a:gs>
+          </a:gsLst>
+          <a:lin ang="5400000" scaled="0"/>
+        </a:gradFill>
+      </a:bgFillStyleLst>
+    </a:fmtScheme>
+  </a:themeElements>
+  <a:objectDefaults/>
+  <a:extraClrSchemeLst/>
+  <a:extLst>
+    <a:ext uri="{05A4C25C-085E-4340-85A3-A5531E510DB2}">
+      <thm15:themeFamily xmlns:thm15="http://schemas.microsoft.com/office/thememl/2012/main" name="Office Theme" id="{62F939B6-93AF-4DB8-9C6B-D6C7DFDC589F}" vid="{4A3C46E8-61CC-4603-A589-7422A47A8E4A}"/>
+    </a:ext>
+  </a:extLst>
+</a:theme>
 </file>
</xml_diff>

<commit_message>
encoded sun, month, and day of year as 2d numbers
</commit_message>
<xml_diff>
--- a/Reports:Notes/Midterm Presentation.pptx
+++ b/Reports:Notes/Midterm Presentation.pptx
@@ -117,6 +117,11 @@
       </a:defRPr>
     </a:lvl9pPr>
   </p:defaultTextStyle>
+  <p:extLst>
+    <p:ext uri="{EFAFB233-063F-42B5-8137-9DF3F51BA10A}">
+      <p15:sldGuideLst xmlns:p15="http://schemas.microsoft.com/office/powerpoint/2012/main"/>
+    </p:ext>
+  </p:extLst>
 </p:presentation>
 </file>
 
@@ -202,7 +207,7 @@
           <a:p>
             <a:fld id="{547B1AA4-F28E-E74F-8275-04A5CC593410}" type="datetimeFigureOut">
               <a:rPr lang="en-US" smtClean="0"/>
-              <a:t>4/7/21</a:t>
+              <a:t>4/23/21</a:t>
             </a:fld>
             <a:endParaRPr lang="en-US"/>
           </a:p>
@@ -700,7 +705,7 @@
           <a:p>
             <a:fld id="{F6C8849A-CD95-F24B-B741-074108127D07}" type="datetimeFigureOut">
               <a:rPr lang="en-US" smtClean="0"/>
-              <a:t>4/3/21</a:t>
+              <a:t>4/23/21</a:t>
             </a:fld>
             <a:endParaRPr lang="en-US"/>
           </a:p>
@@ -898,7 +903,7 @@
           <a:p>
             <a:fld id="{F6C8849A-CD95-F24B-B741-074108127D07}" type="datetimeFigureOut">
               <a:rPr lang="en-US" smtClean="0"/>
-              <a:t>4/3/21</a:t>
+              <a:t>4/23/21</a:t>
             </a:fld>
             <a:endParaRPr lang="en-US"/>
           </a:p>
@@ -1106,7 +1111,7 @@
           <a:p>
             <a:fld id="{F6C8849A-CD95-F24B-B741-074108127D07}" type="datetimeFigureOut">
               <a:rPr lang="en-US" smtClean="0"/>
-              <a:t>4/3/21</a:t>
+              <a:t>4/23/21</a:t>
             </a:fld>
             <a:endParaRPr lang="en-US"/>
           </a:p>
@@ -1304,7 +1309,7 @@
           <a:p>
             <a:fld id="{F6C8849A-CD95-F24B-B741-074108127D07}" type="datetimeFigureOut">
               <a:rPr lang="en-US" smtClean="0"/>
-              <a:t>4/3/21</a:t>
+              <a:t>4/23/21</a:t>
             </a:fld>
             <a:endParaRPr lang="en-US"/>
           </a:p>
@@ -1579,7 +1584,7 @@
           <a:p>
             <a:fld id="{F6C8849A-CD95-F24B-B741-074108127D07}" type="datetimeFigureOut">
               <a:rPr lang="en-US" smtClean="0"/>
-              <a:t>4/3/21</a:t>
+              <a:t>4/23/21</a:t>
             </a:fld>
             <a:endParaRPr lang="en-US"/>
           </a:p>
@@ -1844,7 +1849,7 @@
           <a:p>
             <a:fld id="{F6C8849A-CD95-F24B-B741-074108127D07}" type="datetimeFigureOut">
               <a:rPr lang="en-US" smtClean="0"/>
-              <a:t>4/3/21</a:t>
+              <a:t>4/23/21</a:t>
             </a:fld>
             <a:endParaRPr lang="en-US"/>
           </a:p>
@@ -2256,7 +2261,7 @@
           <a:p>
             <a:fld id="{F6C8849A-CD95-F24B-B741-074108127D07}" type="datetimeFigureOut">
               <a:rPr lang="en-US" smtClean="0"/>
-              <a:t>4/3/21</a:t>
+              <a:t>4/23/21</a:t>
             </a:fld>
             <a:endParaRPr lang="en-US"/>
           </a:p>
@@ -2397,7 +2402,7 @@
           <a:p>
             <a:fld id="{F6C8849A-CD95-F24B-B741-074108127D07}" type="datetimeFigureOut">
               <a:rPr lang="en-US" smtClean="0"/>
-              <a:t>4/3/21</a:t>
+              <a:t>4/23/21</a:t>
             </a:fld>
             <a:endParaRPr lang="en-US"/>
           </a:p>
@@ -2510,7 +2515,7 @@
           <a:p>
             <a:fld id="{F6C8849A-CD95-F24B-B741-074108127D07}" type="datetimeFigureOut">
               <a:rPr lang="en-US" smtClean="0"/>
-              <a:t>4/3/21</a:t>
+              <a:t>4/23/21</a:t>
             </a:fld>
             <a:endParaRPr lang="en-US"/>
           </a:p>
@@ -2821,7 +2826,7 @@
           <a:p>
             <a:fld id="{F6C8849A-CD95-F24B-B741-074108127D07}" type="datetimeFigureOut">
               <a:rPr lang="en-US" smtClean="0"/>
-              <a:t>4/3/21</a:t>
+              <a:t>4/23/21</a:t>
             </a:fld>
             <a:endParaRPr lang="en-US"/>
           </a:p>
@@ -3109,7 +3114,7 @@
           <a:p>
             <a:fld id="{F6C8849A-CD95-F24B-B741-074108127D07}" type="datetimeFigureOut">
               <a:rPr lang="en-US" smtClean="0"/>
-              <a:t>4/3/21</a:t>
+              <a:t>4/23/21</a:t>
             </a:fld>
             <a:endParaRPr lang="en-US"/>
           </a:p>
@@ -3350,7 +3355,7 @@
           <a:p>
             <a:fld id="{F6C8849A-CD95-F24B-B741-074108127D07}" type="datetimeFigureOut">
               <a:rPr lang="en-US" smtClean="0"/>
-              <a:t>4/3/21</a:t>
+              <a:t>4/23/21</a:t>
             </a:fld>
             <a:endParaRPr lang="en-US"/>
           </a:p>
@@ -4616,39 +4621,7 @@
                 <a:ea typeface="CMU Serif Roman" panose="02000603000000000000" pitchFamily="2" charset="0"/>
                 <a:cs typeface="CMU Serif Roman" panose="02000603000000000000" pitchFamily="2" charset="0"/>
               </a:rPr>
-              <a:t>[1] </a:t>
-            </a:r>
-            <a:r>
-              <a:rPr lang="en-US" dirty="0">
-                <a:latin typeface="CMU Serif Roman" panose="02000603000000000000" pitchFamily="2" charset="0"/>
-                <a:ea typeface="CMU Serif Roman" panose="02000603000000000000" pitchFamily="2" charset="0"/>
-                <a:cs typeface="CMU Serif Roman" panose="02000603000000000000" pitchFamily="2" charset="0"/>
-              </a:rPr>
-              <a:t>E. </a:t>
-            </a:r>
-            <a:r>
-              <a:rPr lang="en-US" dirty="0">
-                <a:latin typeface="CMU Serif Roman" panose="02000603000000000000" pitchFamily="2" charset="0"/>
-                <a:ea typeface="CMU Serif Roman" panose="02000603000000000000" pitchFamily="2" charset="0"/>
-                <a:cs typeface="CMU Serif Roman" panose="02000603000000000000" pitchFamily="2" charset="0"/>
-              </a:rPr>
-              <a:t>Isaksson, </a:t>
-            </a:r>
-            <a:r>
-              <a:rPr lang="en-US" dirty="0">
-                <a:latin typeface="CMU Serif Roman" panose="02000603000000000000" pitchFamily="2" charset="0"/>
-                <a:ea typeface="CMU Serif Roman" panose="02000603000000000000" pitchFamily="2" charset="0"/>
-                <a:cs typeface="CMU Serif Roman" panose="02000603000000000000" pitchFamily="2" charset="0"/>
-              </a:rPr>
-              <a:t>M.</a:t>
-            </a:r>
-            <a:r>
-              <a:rPr lang="en-US" dirty="0">
-                <a:latin typeface="CMU Serif Roman" panose="02000603000000000000" pitchFamily="2" charset="0"/>
-                <a:ea typeface="CMU Serif Roman" panose="02000603000000000000" pitchFamily="2" charset="0"/>
-                <a:cs typeface="CMU Serif Roman" panose="02000603000000000000" pitchFamily="2" charset="0"/>
-              </a:rPr>
-              <a:t> Conde. “</a:t>
+              <a:t>[1] E. Isaksson, M. Conde. “</a:t>
             </a:r>
             <a:r>
               <a:rPr lang="en-US" i="1" dirty="0">
@@ -4674,23 +4647,7 @@
                 <a:ea typeface="CMU Serif Roman" panose="02000603000000000000" pitchFamily="2" charset="0"/>
                 <a:cs typeface="CMU Serif Roman" panose="02000603000000000000" pitchFamily="2" charset="0"/>
               </a:rPr>
-              <a:t>[2] </a:t>
-            </a:r>
-            <a:r>
-              <a:rPr lang="en-US" dirty="0">
-                <a:latin typeface="CMU Serif Roman" panose="02000603000000000000" pitchFamily="2" charset="0"/>
-                <a:ea typeface="CMU Serif Roman" panose="02000603000000000000" pitchFamily="2" charset="0"/>
-                <a:cs typeface="CMU Serif Roman" panose="02000603000000000000" pitchFamily="2" charset="0"/>
-              </a:rPr>
-              <a:t>J. </a:t>
-            </a:r>
-            <a:r>
-              <a:rPr lang="en-US" dirty="0">
-                <a:latin typeface="CMU Serif Roman" panose="02000603000000000000" pitchFamily="2" charset="0"/>
-                <a:ea typeface="CMU Serif Roman" panose="02000603000000000000" pitchFamily="2" charset="0"/>
-                <a:cs typeface="CMU Serif Roman" panose="02000603000000000000" pitchFamily="2" charset="0"/>
-              </a:rPr>
-              <a:t>Torres, et al. </a:t>
+              <a:t>[2] J. Torres, et al. </a:t>
             </a:r>
             <a:r>
               <a:rPr lang="en-US" i="1" dirty="0">
@@ -9509,8 +9466,8 @@
           </a:p>
         </p:txBody>
       </p:sp>
-      <mc:AlternateContent xmlns:mc="http://schemas.openxmlformats.org/markup-compatibility/2006">
-        <mc:Choice xmlns:a14="http://schemas.microsoft.com/office/drawing/2010/main" Requires="a14">
+      <mc:AlternateContent xmlns:mc="http://schemas.openxmlformats.org/markup-compatibility/2006" xmlns:a14="http://schemas.microsoft.com/office/drawing/2010/main">
+        <mc:Choice Requires="a14">
           <p:graphicFrame>
             <p:nvGraphicFramePr>
               <p:cNvPr id="4" name="Table 4">
@@ -9995,7 +9952,7 @@
             </a:graphic>
           </p:graphicFrame>
         </mc:Choice>
-        <mc:Fallback>
+        <mc:Fallback xmlns="">
           <p:graphicFrame>
             <p:nvGraphicFramePr>
               <p:cNvPr id="4" name="Table 4">
@@ -11153,14 +11110,14 @@
                 <p:ph idx="1"/>
                 <p:extLst>
                   <p:ext uri="{D42A27DB-BD31-4B8C-83A1-F6EECF244321}">
-                    <p14:modId xmlns:p14="http://schemas.microsoft.com/office/powerpoint/2010/main" val="2887402970"/>
+                    <p14:modId xmlns:p14="http://schemas.microsoft.com/office/powerpoint/2010/main" val="1234831741"/>
                   </p:ext>
                 </p:extLst>
               </p:nvPr>
             </p:nvGraphicFramePr>
             <p:xfrm>
               <a:off x="5591504" y="1264021"/>
-              <a:ext cx="5815725" cy="4202036"/>
+              <a:ext cx="5815725" cy="4246137"/>
             </p:xfrm>
             <a:graphic>
               <a:graphicData uri="http://schemas.openxmlformats.org/drawingml/2006/table">
@@ -11191,7 +11148,7 @@
                       </a:extLst>
                     </a:gridCol>
                   </a:tblGrid>
-                  <a:tr h="789126">
+                  <a:tr h="833227">
                     <a:tc>
                       <a:txBody>
                         <a:bodyPr/>
@@ -11638,14 +11595,14 @@
                 <p:ph idx="1"/>
                 <p:extLst>
                   <p:ext uri="{D42A27DB-BD31-4B8C-83A1-F6EECF244321}">
-                    <p14:modId xmlns:p14="http://schemas.microsoft.com/office/powerpoint/2010/main" val="2887402970"/>
+                    <p14:modId xmlns:p14="http://schemas.microsoft.com/office/powerpoint/2010/main" val="1234831741"/>
                   </p:ext>
                 </p:extLst>
               </p:nvPr>
             </p:nvGraphicFramePr>
             <p:xfrm>
               <a:off x="5591504" y="1264021"/>
-              <a:ext cx="5815725" cy="4202036"/>
+              <a:ext cx="5815725" cy="4246137"/>
             </p:xfrm>
             <a:graphic>
               <a:graphicData uri="http://schemas.openxmlformats.org/drawingml/2006/table">
@@ -11676,7 +11633,7 @@
                       </a:extLst>
                     </a:gridCol>
                   </a:tblGrid>
-                  <a:tr h="789126">
+                  <a:tr h="833227">
                     <a:tc>
                       <a:txBody>
                         <a:bodyPr/>
@@ -11703,7 +11660,7 @@
                         <a:blipFill>
                           <a:blip r:embed="rId2"/>
                           <a:stretch>
-                            <a:fillRect l="-89506" t="-4839" r="-95679" b="-456452"/>
+                            <a:fillRect l="-89506" t="-4545" r="-95679" b="-427273"/>
                           </a:stretch>
                         </a:blipFill>
                       </a:tcPr>
@@ -11720,7 +11677,7 @@
                         <a:blipFill>
                           <a:blip r:embed="rId2"/>
                           <a:stretch>
-                            <a:fillRect l="-200654" t="-4839" r="-1307" b="-456452"/>
+                            <a:fillRect l="-200654" t="-4545" r="-1307" b="-427273"/>
                           </a:stretch>
                         </a:blipFill>
                       </a:tcPr>
@@ -12227,8 +12184,8 @@
           </a:p>
         </p:txBody>
       </p:sp>
-      <mc:AlternateContent xmlns:mc="http://schemas.openxmlformats.org/markup-compatibility/2006">
-        <mc:Choice xmlns:a14="http://schemas.microsoft.com/office/drawing/2010/main" Requires="a14">
+      <mc:AlternateContent xmlns:mc="http://schemas.openxmlformats.org/markup-compatibility/2006" xmlns:a14="http://schemas.microsoft.com/office/drawing/2010/main">
+        <mc:Choice Requires="a14">
           <p:sp>
             <p:nvSpPr>
               <p:cNvPr id="7" name="TextBox 6">
@@ -12257,6 +12214,7 @@
               </a:bodyPr>
               <a:lstStyle/>
               <a:p>
+                <a:pPr/>
                 <a14:m>
                   <m:oMathPara xmlns:m="http://schemas.openxmlformats.org/officeDocument/2006/math">
                     <m:oMathParaPr>
@@ -12302,7 +12260,7 @@
             </p:txBody>
           </p:sp>
         </mc:Choice>
-        <mc:Fallback>
+        <mc:Fallback xmlns="">
           <p:sp>
             <p:nvSpPr>
               <p:cNvPr id="7" name="TextBox 6">
@@ -12347,8 +12305,8 @@
           </p:sp>
         </mc:Fallback>
       </mc:AlternateContent>
-      <mc:AlternateContent xmlns:mc="http://schemas.openxmlformats.org/markup-compatibility/2006">
-        <mc:Choice xmlns:a14="http://schemas.microsoft.com/office/drawing/2010/main" Requires="a14">
+      <mc:AlternateContent xmlns:mc="http://schemas.openxmlformats.org/markup-compatibility/2006" xmlns:a14="http://schemas.microsoft.com/office/drawing/2010/main">
+        <mc:Choice Requires="a14">
           <p:sp>
             <p:nvSpPr>
               <p:cNvPr id="12" name="TextBox 11">
@@ -12377,6 +12335,7 @@
               </a:bodyPr>
               <a:lstStyle/>
               <a:p>
+                <a:pPr/>
                 <a14:m>
                   <m:oMathPara xmlns:m="http://schemas.openxmlformats.org/officeDocument/2006/math">
                     <m:oMathParaPr>
@@ -12422,7 +12381,7 @@
             </p:txBody>
           </p:sp>
         </mc:Choice>
-        <mc:Fallback>
+        <mc:Fallback xmlns="">
           <p:sp>
             <p:nvSpPr>
               <p:cNvPr id="12" name="TextBox 11">

</xml_diff>